<commit_message>
Added Heuristic and Bug slides
</commit_message>
<xml_diff>
--- a/Slides/massa/massa_slides.pptx
+++ b/Slides/massa/massa_slides.pptx
@@ -20,6 +20,12 @@
     <p:sldId id="270" r:id="rId14"/>
     <p:sldId id="269" r:id="rId15"/>
     <p:sldId id="271" r:id="rId16"/>
+    <p:sldId id="272" r:id="rId17"/>
+    <p:sldId id="273" r:id="rId18"/>
+    <p:sldId id="274" r:id="rId19"/>
+    <p:sldId id="275" r:id="rId20"/>
+    <p:sldId id="276" r:id="rId21"/>
+    <p:sldId id="277" r:id="rId22"/>
   </p:sldIdLst>
   <p:sldSz cx="12192000" cy="6858000"/>
   <p:notesSz cx="6858000" cy="9144000"/>
@@ -257,7 +263,7 @@
           <a:p>
             <a:fld id="{F7911355-0418-4ECC-81A9-079035E41CE5}" type="datetimeFigureOut">
               <a:rPr lang="it-IT" smtClean="0"/>
-              <a:t>05/01/2016</a:t>
+              <a:t>06/01/2016</a:t>
             </a:fld>
             <a:endParaRPr lang="it-IT"/>
           </a:p>
@@ -427,7 +433,7 @@
           <a:p>
             <a:fld id="{F7911355-0418-4ECC-81A9-079035E41CE5}" type="datetimeFigureOut">
               <a:rPr lang="it-IT" smtClean="0"/>
-              <a:t>05/01/2016</a:t>
+              <a:t>06/01/2016</a:t>
             </a:fld>
             <a:endParaRPr lang="it-IT"/>
           </a:p>
@@ -607,7 +613,7 @@
           <a:p>
             <a:fld id="{F7911355-0418-4ECC-81A9-079035E41CE5}" type="datetimeFigureOut">
               <a:rPr lang="it-IT" smtClean="0"/>
-              <a:t>05/01/2016</a:t>
+              <a:t>06/01/2016</a:t>
             </a:fld>
             <a:endParaRPr lang="it-IT"/>
           </a:p>
@@ -777,7 +783,7 @@
           <a:p>
             <a:fld id="{F7911355-0418-4ECC-81A9-079035E41CE5}" type="datetimeFigureOut">
               <a:rPr lang="it-IT" smtClean="0"/>
-              <a:t>05/01/2016</a:t>
+              <a:t>06/01/2016</a:t>
             </a:fld>
             <a:endParaRPr lang="it-IT"/>
           </a:p>
@@ -1023,7 +1029,7 @@
           <a:p>
             <a:fld id="{F7911355-0418-4ECC-81A9-079035E41CE5}" type="datetimeFigureOut">
               <a:rPr lang="it-IT" smtClean="0"/>
-              <a:t>05/01/2016</a:t>
+              <a:t>06/01/2016</a:t>
             </a:fld>
             <a:endParaRPr lang="it-IT"/>
           </a:p>
@@ -1255,7 +1261,7 @@
           <a:p>
             <a:fld id="{F7911355-0418-4ECC-81A9-079035E41CE5}" type="datetimeFigureOut">
               <a:rPr lang="it-IT" smtClean="0"/>
-              <a:t>05/01/2016</a:t>
+              <a:t>06/01/2016</a:t>
             </a:fld>
             <a:endParaRPr lang="it-IT"/>
           </a:p>
@@ -1622,7 +1628,7 @@
           <a:p>
             <a:fld id="{F7911355-0418-4ECC-81A9-079035E41CE5}" type="datetimeFigureOut">
               <a:rPr lang="it-IT" smtClean="0"/>
-              <a:t>05/01/2016</a:t>
+              <a:t>06/01/2016</a:t>
             </a:fld>
             <a:endParaRPr lang="it-IT"/>
           </a:p>
@@ -1740,7 +1746,7 @@
           <a:p>
             <a:fld id="{F7911355-0418-4ECC-81A9-079035E41CE5}" type="datetimeFigureOut">
               <a:rPr lang="it-IT" smtClean="0"/>
-              <a:t>05/01/2016</a:t>
+              <a:t>06/01/2016</a:t>
             </a:fld>
             <a:endParaRPr lang="it-IT"/>
           </a:p>
@@ -1835,7 +1841,7 @@
           <a:p>
             <a:fld id="{F7911355-0418-4ECC-81A9-079035E41CE5}" type="datetimeFigureOut">
               <a:rPr lang="it-IT" smtClean="0"/>
-              <a:t>05/01/2016</a:t>
+              <a:t>06/01/2016</a:t>
             </a:fld>
             <a:endParaRPr lang="it-IT"/>
           </a:p>
@@ -2112,7 +2118,7 @@
           <a:p>
             <a:fld id="{F7911355-0418-4ECC-81A9-079035E41CE5}" type="datetimeFigureOut">
               <a:rPr lang="it-IT" smtClean="0"/>
-              <a:t>05/01/2016</a:t>
+              <a:t>06/01/2016</a:t>
             </a:fld>
             <a:endParaRPr lang="it-IT"/>
           </a:p>
@@ -2365,7 +2371,7 @@
           <a:p>
             <a:fld id="{F7911355-0418-4ECC-81A9-079035E41CE5}" type="datetimeFigureOut">
               <a:rPr lang="it-IT" smtClean="0"/>
-              <a:t>05/01/2016</a:t>
+              <a:t>06/01/2016</a:t>
             </a:fld>
             <a:endParaRPr lang="it-IT"/>
           </a:p>
@@ -2578,7 +2584,7 @@
           <a:p>
             <a:fld id="{F7911355-0418-4ECC-81A9-079035E41CE5}" type="datetimeFigureOut">
               <a:rPr lang="it-IT" smtClean="0"/>
-              <a:t>05/01/2016</a:t>
+              <a:t>06/01/2016</a:t>
             </a:fld>
             <a:endParaRPr lang="it-IT"/>
           </a:p>
@@ -4786,6 +4792,731 @@
 </p:sld>
 </file>
 
+<file path=ppt/slides/slide16.xml><?xml version="1.0" encoding="utf-8"?>
+<p:sld xmlns:a="http://schemas.openxmlformats.org/drawingml/2006/main" xmlns:r="http://schemas.openxmlformats.org/officeDocument/2006/relationships" xmlns:p="http://schemas.openxmlformats.org/presentationml/2006/main">
+  <p:cSld>
+    <p:spTree>
+      <p:nvGrpSpPr>
+        <p:cNvPr id="1" name=""/>
+        <p:cNvGrpSpPr/>
+        <p:nvPr/>
+      </p:nvGrpSpPr>
+      <p:grpSpPr>
+        <a:xfrm>
+          <a:off x="0" y="0"/>
+          <a:ext cx="0" cy="0"/>
+          <a:chOff x="0" y="0"/>
+          <a:chExt cx="0" cy="0"/>
+        </a:xfrm>
+      </p:grpSpPr>
+      <p:sp>
+        <p:nvSpPr>
+          <p:cNvPr id="2" name="Title 1"/>
+          <p:cNvSpPr>
+            <a:spLocks noGrp="1"/>
+          </p:cNvSpPr>
+          <p:nvPr>
+            <p:ph type="ctrTitle"/>
+          </p:nvPr>
+        </p:nvSpPr>
+        <p:spPr/>
+        <p:txBody>
+          <a:bodyPr/>
+          <a:lstStyle/>
+          <a:p>
+            <a:r>
+              <a:rPr lang="en-US" dirty="0" smtClean="0"/>
+              <a:t>Adversary Game</a:t>
+            </a:r>
+            <a:endParaRPr lang="it-IT" dirty="0"/>
+          </a:p>
+        </p:txBody>
+      </p:sp>
+    </p:spTree>
+    <p:extLst>
+      <p:ext uri="{BB962C8B-B14F-4D97-AF65-F5344CB8AC3E}">
+        <p14:creationId xmlns:p14="http://schemas.microsoft.com/office/powerpoint/2010/main" val="1094527766"/>
+      </p:ext>
+    </p:extLst>
+  </p:cSld>
+  <p:clrMapOvr>
+    <a:masterClrMapping/>
+  </p:clrMapOvr>
+</p:sld>
+</file>
+
+<file path=ppt/slides/slide17.xml><?xml version="1.0" encoding="utf-8"?>
+<p:sld xmlns:a="http://schemas.openxmlformats.org/drawingml/2006/main" xmlns:r="http://schemas.openxmlformats.org/officeDocument/2006/relationships" xmlns:p="http://schemas.openxmlformats.org/presentationml/2006/main">
+  <p:cSld>
+    <p:spTree>
+      <p:nvGrpSpPr>
+        <p:cNvPr id="1" name=""/>
+        <p:cNvGrpSpPr/>
+        <p:nvPr/>
+      </p:nvGrpSpPr>
+      <p:grpSpPr>
+        <a:xfrm>
+          <a:off x="0" y="0"/>
+          <a:ext cx="0" cy="0"/>
+          <a:chOff x="0" y="0"/>
+          <a:chExt cx="0" cy="0"/>
+        </a:xfrm>
+      </p:grpSpPr>
+      <p:sp>
+        <p:nvSpPr>
+          <p:cNvPr id="2" name="Title 1"/>
+          <p:cNvSpPr>
+            <a:spLocks noGrp="1"/>
+          </p:cNvSpPr>
+          <p:nvPr>
+            <p:ph type="title"/>
+          </p:nvPr>
+        </p:nvSpPr>
+        <p:spPr>
+          <a:xfrm>
+            <a:off x="838200" y="1"/>
+            <a:ext cx="10515600" cy="1035170"/>
+          </a:xfrm>
+        </p:spPr>
+        <p:txBody>
+          <a:bodyPr/>
+          <a:lstStyle/>
+          <a:p>
+            <a:pPr algn="ctr"/>
+            <a:r>
+              <a:rPr lang="en-US" dirty="0" smtClean="0"/>
+              <a:t>Heuristic function</a:t>
+            </a:r>
+            <a:endParaRPr lang="it-IT" dirty="0"/>
+          </a:p>
+        </p:txBody>
+      </p:sp>
+      <p:sp>
+        <p:nvSpPr>
+          <p:cNvPr id="3" name="Content Placeholder 2"/>
+          <p:cNvSpPr>
+            <a:spLocks noGrp="1"/>
+          </p:cNvSpPr>
+          <p:nvPr>
+            <p:ph idx="1"/>
+          </p:nvPr>
+        </p:nvSpPr>
+        <p:spPr>
+          <a:xfrm>
+            <a:off x="5237672" y="1035171"/>
+            <a:ext cx="6485626" cy="4351338"/>
+          </a:xfrm>
+        </p:spPr>
+        <p:txBody>
+          <a:bodyPr>
+            <a:normAutofit fontScale="92500" lnSpcReduction="20000"/>
+          </a:bodyPr>
+          <a:lstStyle/>
+          <a:p>
+            <a:r>
+              <a:rPr lang="en-US" dirty="0" smtClean="0"/>
+              <a:t>H0: First valid move (furthest valid bin from my home)</a:t>
+            </a:r>
+          </a:p>
+          <a:p>
+            <a:r>
+              <a:rPr lang="en-US" dirty="0" smtClean="0"/>
+              <a:t>H1: How far ahead of my opponent I am </a:t>
+            </a:r>
+            <a:r>
+              <a:rPr lang="it-IT" dirty="0"/>
+              <a:t>(My Mancala – Opponent’s Mancala) </a:t>
+            </a:r>
+            <a:endParaRPr lang="en-US" dirty="0" smtClean="0"/>
+          </a:p>
+          <a:p>
+            <a:r>
+              <a:rPr lang="en-US" dirty="0" smtClean="0"/>
+              <a:t>H2: How close I am to winning (&gt; half) </a:t>
+            </a:r>
+          </a:p>
+          <a:p>
+            <a:r>
+              <a:rPr lang="en-US" dirty="0" smtClean="0"/>
+              <a:t>H3: How close opponent is to winning (&gt; half) </a:t>
+            </a:r>
+          </a:p>
+          <a:p>
+            <a:r>
+              <a:rPr lang="en-US" dirty="0" smtClean="0"/>
+              <a:t>H4: Number of stones close to my home </a:t>
+            </a:r>
+          </a:p>
+          <a:p>
+            <a:r>
+              <a:rPr lang="en-US" dirty="0" smtClean="0"/>
+              <a:t>H5: Number of stones far away from my home </a:t>
+            </a:r>
+          </a:p>
+          <a:p>
+            <a:r>
+              <a:rPr lang="en-US" dirty="0" smtClean="0"/>
+              <a:t>H6: Number of stones in middle of board (neither close nor far from home) </a:t>
+            </a:r>
+          </a:p>
+          <a:p>
+            <a:endParaRPr lang="it-IT" dirty="0"/>
+          </a:p>
+        </p:txBody>
+      </p:sp>
+      <p:pic>
+        <p:nvPicPr>
+          <p:cNvPr id="4" name="Picture 3"/>
+          <p:cNvPicPr>
+            <a:picLocks noChangeAspect="1"/>
+          </p:cNvPicPr>
+          <p:nvPr/>
+        </p:nvPicPr>
+        <p:blipFill>
+          <a:blip r:embed="rId2">
+            <a:extLst>
+              <a:ext uri="{28A0092B-C50C-407E-A947-70E740481C1C}">
+                <a14:useLocalDpi xmlns:a14="http://schemas.microsoft.com/office/drawing/2010/main" val="0"/>
+              </a:ext>
+            </a:extLst>
+          </a:blip>
+          <a:stretch>
+            <a:fillRect/>
+          </a:stretch>
+        </p:blipFill>
+        <p:spPr>
+          <a:xfrm>
+            <a:off x="264954" y="1035171"/>
+            <a:ext cx="4972718" cy="3266393"/>
+          </a:xfrm>
+          <a:prstGeom prst="rect">
+            <a:avLst/>
+          </a:prstGeom>
+        </p:spPr>
+      </p:pic>
+      <p:sp>
+        <p:nvSpPr>
+          <p:cNvPr id="6" name="TextBox 5"/>
+          <p:cNvSpPr txBox="1"/>
+          <p:nvPr/>
+        </p:nvSpPr>
+        <p:spPr>
+          <a:xfrm>
+            <a:off x="258792" y="4580626"/>
+            <a:ext cx="4978880" cy="923330"/>
+          </a:xfrm>
+          <a:prstGeom prst="rect">
+            <a:avLst/>
+          </a:prstGeom>
+          <a:noFill/>
+        </p:spPr>
+        <p:txBody>
+          <a:bodyPr wrap="square" rtlCol="0">
+            <a:spAutoFit/>
+          </a:bodyPr>
+          <a:lstStyle/>
+          <a:p>
+            <a:r>
+              <a:rPr lang="en-US" dirty="0" smtClean="0"/>
+              <a:t>Source: </a:t>
+            </a:r>
+            <a:r>
+              <a:rPr lang="en-US" dirty="0" smtClean="0">
+                <a:hlinkClick r:id="rId3"/>
+              </a:rPr>
+              <a:t>www.ittc.ku.edu/publications/documents/Gifford_ITTC-FY2009-TR-03050-03.pdf</a:t>
+            </a:r>
+            <a:endParaRPr lang="it-IT" dirty="0"/>
+          </a:p>
+        </p:txBody>
+      </p:sp>
+      <p:sp>
+        <p:nvSpPr>
+          <p:cNvPr id="8" name="TextBox 7"/>
+          <p:cNvSpPr txBox="1"/>
+          <p:nvPr/>
+        </p:nvSpPr>
+        <p:spPr>
+          <a:xfrm>
+            <a:off x="1043795" y="5665571"/>
+            <a:ext cx="9445925" cy="584775"/>
+          </a:xfrm>
+          <a:prstGeom prst="rect">
+            <a:avLst/>
+          </a:prstGeom>
+          <a:noFill/>
+        </p:spPr>
+        <p:txBody>
+          <a:bodyPr wrap="square" rtlCol="0">
+            <a:spAutoFit/>
+          </a:bodyPr>
+          <a:lstStyle/>
+          <a:p>
+            <a:r>
+              <a:rPr lang="en-US" sz="3200" dirty="0" smtClean="0"/>
+              <a:t>Result: H1, H3 and H2 were the best Heuristics in order</a:t>
+            </a:r>
+            <a:endParaRPr lang="it-IT" sz="3200" dirty="0"/>
+          </a:p>
+        </p:txBody>
+      </p:sp>
+    </p:spTree>
+    <p:extLst>
+      <p:ext uri="{BB962C8B-B14F-4D97-AF65-F5344CB8AC3E}">
+        <p14:creationId xmlns:p14="http://schemas.microsoft.com/office/powerpoint/2010/main" val="1797332942"/>
+      </p:ext>
+    </p:extLst>
+  </p:cSld>
+  <p:clrMapOvr>
+    <a:masterClrMapping/>
+  </p:clrMapOvr>
+</p:sld>
+</file>
+
+<file path=ppt/slides/slide18.xml><?xml version="1.0" encoding="utf-8"?>
+<p:sld xmlns:a="http://schemas.openxmlformats.org/drawingml/2006/main" xmlns:r="http://schemas.openxmlformats.org/officeDocument/2006/relationships" xmlns:p="http://schemas.openxmlformats.org/presentationml/2006/main">
+  <p:cSld>
+    <p:spTree>
+      <p:nvGrpSpPr>
+        <p:cNvPr id="1" name=""/>
+        <p:cNvGrpSpPr/>
+        <p:nvPr/>
+      </p:nvGrpSpPr>
+      <p:grpSpPr>
+        <a:xfrm>
+          <a:off x="0" y="0"/>
+          <a:ext cx="0" cy="0"/>
+          <a:chOff x="0" y="0"/>
+          <a:chExt cx="0" cy="0"/>
+        </a:xfrm>
+      </p:grpSpPr>
+      <p:sp>
+        <p:nvSpPr>
+          <p:cNvPr id="2" name="Title 1"/>
+          <p:cNvSpPr>
+            <a:spLocks noGrp="1"/>
+          </p:cNvSpPr>
+          <p:nvPr>
+            <p:ph type="title"/>
+          </p:nvPr>
+        </p:nvSpPr>
+        <p:spPr>
+          <a:xfrm>
+            <a:off x="838200" y="1"/>
+            <a:ext cx="10515600" cy="1035170"/>
+          </a:xfrm>
+        </p:spPr>
+        <p:txBody>
+          <a:bodyPr/>
+          <a:lstStyle/>
+          <a:p>
+            <a:pPr algn="ctr"/>
+            <a:r>
+              <a:rPr lang="en-US" dirty="0" smtClean="0"/>
+              <a:t>Heuristic function</a:t>
+            </a:r>
+            <a:endParaRPr lang="it-IT" dirty="0"/>
+          </a:p>
+        </p:txBody>
+      </p:sp>
+      <p:sp>
+        <p:nvSpPr>
+          <p:cNvPr id="3" name="Content Placeholder 2"/>
+          <p:cNvSpPr>
+            <a:spLocks noGrp="1"/>
+          </p:cNvSpPr>
+          <p:nvPr>
+            <p:ph idx="1"/>
+          </p:nvPr>
+        </p:nvSpPr>
+        <p:spPr>
+          <a:xfrm>
+            <a:off x="6096000" y="1166367"/>
+            <a:ext cx="5952226" cy="4839416"/>
+          </a:xfrm>
+        </p:spPr>
+        <p:txBody>
+          <a:bodyPr>
+            <a:normAutofit lnSpcReduction="10000"/>
+          </a:bodyPr>
+          <a:lstStyle/>
+          <a:p>
+            <a:r>
+              <a:rPr lang="en-US" dirty="0" smtClean="0"/>
+              <a:t>H1: How far ahead of my opponent I am </a:t>
+            </a:r>
+            <a:r>
+              <a:rPr lang="it-IT" dirty="0"/>
+              <a:t>(My Mancala – Opponent’s Mancala) </a:t>
+            </a:r>
+            <a:endParaRPr lang="en-US" dirty="0" smtClean="0"/>
+          </a:p>
+          <a:p>
+            <a:r>
+              <a:rPr lang="en-US" dirty="0" smtClean="0"/>
+              <a:t>H2: How close I am to winning (&gt; half)</a:t>
+            </a:r>
+          </a:p>
+          <a:p>
+            <a:r>
+              <a:rPr lang="en-US" dirty="0" smtClean="0"/>
+              <a:t>M1: How much can I eat (Doubled)</a:t>
+            </a:r>
+          </a:p>
+          <a:p>
+            <a:r>
+              <a:rPr lang="en-US" dirty="0" smtClean="0"/>
+              <a:t>M2: I have an additional turn</a:t>
+            </a:r>
+          </a:p>
+          <a:p>
+            <a:r>
+              <a:rPr lang="en-US" dirty="0" smtClean="0"/>
+              <a:t>H3: How close opponent is to winning (&gt; half) </a:t>
+            </a:r>
+          </a:p>
+          <a:p>
+            <a:r>
+              <a:rPr lang="en-US" dirty="0" smtClean="0"/>
+              <a:t>M3: How much can my opponent eat</a:t>
+            </a:r>
+          </a:p>
+          <a:p>
+            <a:r>
+              <a:rPr lang="en-US" dirty="0" smtClean="0"/>
+              <a:t>M4: My opponent has an additional turn</a:t>
+            </a:r>
+          </a:p>
+          <a:p>
+            <a:endParaRPr lang="it-IT" dirty="0"/>
+          </a:p>
+        </p:txBody>
+      </p:sp>
+      <p:pic>
+        <p:nvPicPr>
+          <p:cNvPr id="5" name="Picture 4"/>
+          <p:cNvPicPr>
+            <a:picLocks noChangeAspect="1"/>
+          </p:cNvPicPr>
+          <p:nvPr/>
+        </p:nvPicPr>
+        <p:blipFill>
+          <a:blip r:embed="rId2">
+            <a:extLst>
+              <a:ext uri="{28A0092B-C50C-407E-A947-70E740481C1C}">
+                <a14:useLocalDpi xmlns:a14="http://schemas.microsoft.com/office/drawing/2010/main" val="0"/>
+              </a:ext>
+            </a:extLst>
+          </a:blip>
+          <a:stretch>
+            <a:fillRect/>
+          </a:stretch>
+        </p:blipFill>
+        <p:spPr>
+          <a:xfrm>
+            <a:off x="225293" y="1035171"/>
+            <a:ext cx="5951220" cy="5067300"/>
+          </a:xfrm>
+          <a:prstGeom prst="rect">
+            <a:avLst/>
+          </a:prstGeom>
+        </p:spPr>
+      </p:pic>
+      <p:cxnSp>
+        <p:nvCxnSpPr>
+          <p:cNvPr id="11" name="Straight Arrow Connector 10"/>
+          <p:cNvCxnSpPr/>
+          <p:nvPr/>
+        </p:nvCxnSpPr>
+        <p:spPr>
+          <a:xfrm flipH="1">
+            <a:off x="5236234" y="1388853"/>
+            <a:ext cx="940279" cy="1121434"/>
+          </a:xfrm>
+          <a:prstGeom prst="straightConnector1">
+            <a:avLst/>
+          </a:prstGeom>
+          <a:ln w="28575">
+            <a:solidFill>
+              <a:srgbClr val="FF0000"/>
+            </a:solidFill>
+            <a:tailEnd type="triangle"/>
+          </a:ln>
+        </p:spPr>
+        <p:style>
+          <a:lnRef idx="1">
+            <a:schemeClr val="accent1"/>
+          </a:lnRef>
+          <a:fillRef idx="0">
+            <a:schemeClr val="accent1"/>
+          </a:fillRef>
+          <a:effectRef idx="0">
+            <a:schemeClr val="accent1"/>
+          </a:effectRef>
+          <a:fontRef idx="minor">
+            <a:schemeClr val="tx1"/>
+          </a:fontRef>
+        </p:style>
+      </p:cxnSp>
+      <p:cxnSp>
+        <p:nvCxnSpPr>
+          <p:cNvPr id="13" name="Straight Arrow Connector 12"/>
+          <p:cNvCxnSpPr/>
+          <p:nvPr/>
+        </p:nvCxnSpPr>
+        <p:spPr>
+          <a:xfrm flipH="1">
+            <a:off x="4994694" y="2518913"/>
+            <a:ext cx="1181819" cy="258793"/>
+          </a:xfrm>
+          <a:prstGeom prst="straightConnector1">
+            <a:avLst/>
+          </a:prstGeom>
+          <a:ln w="28575">
+            <a:solidFill>
+              <a:srgbClr val="FF0000"/>
+            </a:solidFill>
+            <a:tailEnd type="triangle"/>
+          </a:ln>
+        </p:spPr>
+        <p:style>
+          <a:lnRef idx="1">
+            <a:schemeClr val="accent1"/>
+          </a:lnRef>
+          <a:fillRef idx="0">
+            <a:schemeClr val="accent1"/>
+          </a:fillRef>
+          <a:effectRef idx="0">
+            <a:schemeClr val="accent1"/>
+          </a:effectRef>
+          <a:fontRef idx="minor">
+            <a:schemeClr val="tx1"/>
+          </a:fontRef>
+        </p:style>
+      </p:cxnSp>
+      <p:cxnSp>
+        <p:nvCxnSpPr>
+          <p:cNvPr id="15" name="Straight Arrow Connector 14"/>
+          <p:cNvCxnSpPr/>
+          <p:nvPr/>
+        </p:nvCxnSpPr>
+        <p:spPr>
+          <a:xfrm flipH="1" flipV="1">
+            <a:off x="5706373" y="2958860"/>
+            <a:ext cx="470140" cy="17253"/>
+          </a:xfrm>
+          <a:prstGeom prst="straightConnector1">
+            <a:avLst/>
+          </a:prstGeom>
+          <a:ln w="28575">
+            <a:solidFill>
+              <a:srgbClr val="FF0000"/>
+            </a:solidFill>
+            <a:tailEnd type="triangle"/>
+          </a:ln>
+        </p:spPr>
+        <p:style>
+          <a:lnRef idx="1">
+            <a:schemeClr val="accent1"/>
+          </a:lnRef>
+          <a:fillRef idx="0">
+            <a:schemeClr val="accent1"/>
+          </a:fillRef>
+          <a:effectRef idx="0">
+            <a:schemeClr val="accent1"/>
+          </a:effectRef>
+          <a:fontRef idx="minor">
+            <a:schemeClr val="tx1"/>
+          </a:fontRef>
+        </p:style>
+      </p:cxnSp>
+      <p:cxnSp>
+        <p:nvCxnSpPr>
+          <p:cNvPr id="19" name="Straight Arrow Connector 18"/>
+          <p:cNvCxnSpPr/>
+          <p:nvPr/>
+        </p:nvCxnSpPr>
+        <p:spPr>
+          <a:xfrm flipH="1" flipV="1">
+            <a:off x="5495026" y="3234906"/>
+            <a:ext cx="681487" cy="189781"/>
+          </a:xfrm>
+          <a:prstGeom prst="straightConnector1">
+            <a:avLst/>
+          </a:prstGeom>
+          <a:ln w="28575">
+            <a:solidFill>
+              <a:srgbClr val="FF0000"/>
+            </a:solidFill>
+            <a:tailEnd type="triangle"/>
+          </a:ln>
+        </p:spPr>
+        <p:style>
+          <a:lnRef idx="1">
+            <a:schemeClr val="accent1"/>
+          </a:lnRef>
+          <a:fillRef idx="0">
+            <a:schemeClr val="accent1"/>
+          </a:fillRef>
+          <a:effectRef idx="0">
+            <a:schemeClr val="accent1"/>
+          </a:effectRef>
+          <a:fontRef idx="minor">
+            <a:schemeClr val="tx1"/>
+          </a:fontRef>
+        </p:style>
+      </p:cxnSp>
+      <p:cxnSp>
+        <p:nvCxnSpPr>
+          <p:cNvPr id="21" name="Straight Arrow Connector 20"/>
+          <p:cNvCxnSpPr/>
+          <p:nvPr/>
+        </p:nvCxnSpPr>
+        <p:spPr>
+          <a:xfrm flipH="1">
+            <a:off x="4994694" y="3930231"/>
+            <a:ext cx="1181819" cy="598637"/>
+          </a:xfrm>
+          <a:prstGeom prst="straightConnector1">
+            <a:avLst/>
+          </a:prstGeom>
+          <a:ln w="28575">
+            <a:solidFill>
+              <a:srgbClr val="FF0000"/>
+            </a:solidFill>
+            <a:tailEnd type="triangle"/>
+          </a:ln>
+        </p:spPr>
+        <p:style>
+          <a:lnRef idx="1">
+            <a:schemeClr val="accent1"/>
+          </a:lnRef>
+          <a:fillRef idx="0">
+            <a:schemeClr val="accent1"/>
+          </a:fillRef>
+          <a:effectRef idx="0">
+            <a:schemeClr val="accent1"/>
+          </a:effectRef>
+          <a:fontRef idx="minor">
+            <a:schemeClr val="tx1"/>
+          </a:fontRef>
+        </p:style>
+      </p:cxnSp>
+      <p:cxnSp>
+        <p:nvCxnSpPr>
+          <p:cNvPr id="23" name="Straight Arrow Connector 22"/>
+          <p:cNvCxnSpPr/>
+          <p:nvPr/>
+        </p:nvCxnSpPr>
+        <p:spPr>
+          <a:xfrm flipH="1">
+            <a:off x="5605732" y="4718649"/>
+            <a:ext cx="570781" cy="35809"/>
+          </a:xfrm>
+          <a:prstGeom prst="straightConnector1">
+            <a:avLst/>
+          </a:prstGeom>
+          <a:ln w="28575">
+            <a:solidFill>
+              <a:srgbClr val="FF0000"/>
+            </a:solidFill>
+            <a:tailEnd type="triangle"/>
+          </a:ln>
+        </p:spPr>
+        <p:style>
+          <a:lnRef idx="1">
+            <a:schemeClr val="accent1"/>
+          </a:lnRef>
+          <a:fillRef idx="0">
+            <a:schemeClr val="accent1"/>
+          </a:fillRef>
+          <a:effectRef idx="0">
+            <a:schemeClr val="accent1"/>
+          </a:effectRef>
+          <a:fontRef idx="minor">
+            <a:schemeClr val="tx1"/>
+          </a:fontRef>
+        </p:style>
+      </p:cxnSp>
+      <p:cxnSp>
+        <p:nvCxnSpPr>
+          <p:cNvPr id="25" name="Straight Arrow Connector 24"/>
+          <p:cNvCxnSpPr/>
+          <p:nvPr/>
+        </p:nvCxnSpPr>
+        <p:spPr>
+          <a:xfrm flipH="1" flipV="1">
+            <a:off x="5454770" y="5066312"/>
+            <a:ext cx="721744" cy="157881"/>
+          </a:xfrm>
+          <a:prstGeom prst="straightConnector1">
+            <a:avLst/>
+          </a:prstGeom>
+          <a:ln w="28575">
+            <a:solidFill>
+              <a:srgbClr val="FF0000"/>
+            </a:solidFill>
+            <a:tailEnd type="triangle"/>
+          </a:ln>
+        </p:spPr>
+        <p:style>
+          <a:lnRef idx="1">
+            <a:schemeClr val="accent1"/>
+          </a:lnRef>
+          <a:fillRef idx="0">
+            <a:schemeClr val="accent1"/>
+          </a:fillRef>
+          <a:effectRef idx="0">
+            <a:schemeClr val="accent1"/>
+          </a:effectRef>
+          <a:fontRef idx="minor">
+            <a:schemeClr val="tx1"/>
+          </a:fontRef>
+        </p:style>
+      </p:cxnSp>
+    </p:spTree>
+    <p:extLst>
+      <p:ext uri="{BB962C8B-B14F-4D97-AF65-F5344CB8AC3E}">
+        <p14:creationId xmlns:p14="http://schemas.microsoft.com/office/powerpoint/2010/main" val="3456573271"/>
+      </p:ext>
+    </p:extLst>
+  </p:cSld>
+  <p:clrMapOvr>
+    <a:masterClrMapping/>
+  </p:clrMapOvr>
+</p:sld>
+</file>
+
+<file path=ppt/slides/slide19.xml><?xml version="1.0" encoding="utf-8"?>
+<p:sld xmlns:a="http://schemas.openxmlformats.org/drawingml/2006/main" xmlns:r="http://schemas.openxmlformats.org/officeDocument/2006/relationships" xmlns:p="http://schemas.openxmlformats.org/presentationml/2006/main">
+  <p:cSld>
+    <p:spTree>
+      <p:nvGrpSpPr>
+        <p:cNvPr id="1" name=""/>
+        <p:cNvGrpSpPr/>
+        <p:nvPr/>
+      </p:nvGrpSpPr>
+      <p:grpSpPr>
+        <a:xfrm>
+          <a:off x="0" y="0"/>
+          <a:ext cx="0" cy="0"/>
+          <a:chOff x="0" y="0"/>
+          <a:chExt cx="0" cy="0"/>
+        </a:xfrm>
+      </p:grpSpPr>
+    </p:spTree>
+    <p:extLst>
+      <p:ext uri="{BB962C8B-B14F-4D97-AF65-F5344CB8AC3E}">
+        <p14:creationId xmlns:p14="http://schemas.microsoft.com/office/powerpoint/2010/main" val="3549002738"/>
+      </p:ext>
+    </p:extLst>
+  </p:cSld>
+  <p:clrMapOvr>
+    <a:masterClrMapping/>
+  </p:clrMapOvr>
+</p:sld>
+</file>
+
 <file path=ppt/slides/slide2.xml><?xml version="1.0" encoding="utf-8"?>
 <p:sld xmlns:a="http://schemas.openxmlformats.org/drawingml/2006/main" xmlns:r="http://schemas.openxmlformats.org/officeDocument/2006/relationships" xmlns:p="http://schemas.openxmlformats.org/presentationml/2006/main">
   <p:cSld>
@@ -4986,6 +5717,1006 @@
       </p:par>
     </p:tnLst>
   </p:timing>
+</p:sld>
+</file>
+
+<file path=ppt/slides/slide20.xml><?xml version="1.0" encoding="utf-8"?>
+<p:sld xmlns:a="http://schemas.openxmlformats.org/drawingml/2006/main" xmlns:r="http://schemas.openxmlformats.org/officeDocument/2006/relationships" xmlns:p="http://schemas.openxmlformats.org/presentationml/2006/main">
+  <p:cSld>
+    <p:spTree>
+      <p:nvGrpSpPr>
+        <p:cNvPr id="1" name=""/>
+        <p:cNvGrpSpPr/>
+        <p:nvPr/>
+      </p:nvGrpSpPr>
+      <p:grpSpPr>
+        <a:xfrm>
+          <a:off x="0" y="0"/>
+          <a:ext cx="0" cy="0"/>
+          <a:chOff x="0" y="0"/>
+          <a:chExt cx="0" cy="0"/>
+        </a:xfrm>
+      </p:grpSpPr>
+      <p:sp>
+        <p:nvSpPr>
+          <p:cNvPr id="6" name="Rounded Rectangle 5"/>
+          <p:cNvSpPr/>
+          <p:nvPr/>
+        </p:nvSpPr>
+        <p:spPr>
+          <a:xfrm>
+            <a:off x="4451230" y="1751162"/>
+            <a:ext cx="3140015" cy="1181819"/>
+          </a:xfrm>
+          <a:prstGeom prst="roundRect">
+            <a:avLst/>
+          </a:prstGeom>
+        </p:spPr>
+        <p:style>
+          <a:lnRef idx="2">
+            <a:schemeClr val="accent1">
+              <a:shade val="50000"/>
+            </a:schemeClr>
+          </a:lnRef>
+          <a:fillRef idx="1">
+            <a:schemeClr val="accent1"/>
+          </a:fillRef>
+          <a:effectRef idx="0">
+            <a:schemeClr val="accent1"/>
+          </a:effectRef>
+          <a:fontRef idx="minor">
+            <a:schemeClr val="lt1"/>
+          </a:fontRef>
+        </p:style>
+        <p:txBody>
+          <a:bodyPr rtlCol="0" anchor="ctr"/>
+          <a:lstStyle/>
+          <a:p>
+            <a:pPr algn="ctr"/>
+            <a:endParaRPr lang="it-IT"/>
+          </a:p>
+        </p:txBody>
+      </p:sp>
+      <p:sp>
+        <p:nvSpPr>
+          <p:cNvPr id="2" name="Title 1"/>
+          <p:cNvSpPr>
+            <a:spLocks noGrp="1"/>
+          </p:cNvSpPr>
+          <p:nvPr>
+            <p:ph type="title"/>
+          </p:nvPr>
+        </p:nvSpPr>
+        <p:spPr>
+          <a:xfrm>
+            <a:off x="838200" y="218476"/>
+            <a:ext cx="10515600" cy="1325563"/>
+          </a:xfrm>
+        </p:spPr>
+        <p:txBody>
+          <a:bodyPr/>
+          <a:lstStyle/>
+          <a:p>
+            <a:pPr algn="ctr"/>
+            <a:r>
+              <a:rPr lang="en-US" dirty="0" smtClean="0"/>
+              <a:t>Group 7 Bugs</a:t>
+            </a:r>
+            <a:endParaRPr lang="it-IT" dirty="0"/>
+          </a:p>
+        </p:txBody>
+      </p:sp>
+      <p:sp>
+        <p:nvSpPr>
+          <p:cNvPr id="5" name="TextBox 4"/>
+          <p:cNvSpPr txBox="1"/>
+          <p:nvPr/>
+        </p:nvSpPr>
+        <p:spPr>
+          <a:xfrm>
+            <a:off x="4833667" y="2111238"/>
+            <a:ext cx="2375140" cy="461665"/>
+          </a:xfrm>
+          <a:prstGeom prst="rect">
+            <a:avLst/>
+          </a:prstGeom>
+          <a:noFill/>
+        </p:spPr>
+        <p:txBody>
+          <a:bodyPr wrap="square" rtlCol="0">
+            <a:spAutoFit/>
+          </a:bodyPr>
+          <a:lstStyle/>
+          <a:p>
+            <a:r>
+              <a:rPr lang="en-US" sz="2400" dirty="0" smtClean="0"/>
+              <a:t>22 Bugs Reported</a:t>
+            </a:r>
+            <a:endParaRPr lang="it-IT" sz="2400" dirty="0"/>
+          </a:p>
+        </p:txBody>
+      </p:sp>
+      <p:sp>
+        <p:nvSpPr>
+          <p:cNvPr id="7" name="Rounded Rectangle 6"/>
+          <p:cNvSpPr/>
+          <p:nvPr/>
+        </p:nvSpPr>
+        <p:spPr>
+          <a:xfrm>
+            <a:off x="1311215" y="4017034"/>
+            <a:ext cx="3140015" cy="1181819"/>
+          </a:xfrm>
+          <a:prstGeom prst="roundRect">
+            <a:avLst/>
+          </a:prstGeom>
+          <a:solidFill>
+            <a:srgbClr val="92D050"/>
+          </a:solidFill>
+        </p:spPr>
+        <p:style>
+          <a:lnRef idx="2">
+            <a:schemeClr val="accent1">
+              <a:shade val="50000"/>
+            </a:schemeClr>
+          </a:lnRef>
+          <a:fillRef idx="1">
+            <a:schemeClr val="accent1"/>
+          </a:fillRef>
+          <a:effectRef idx="0">
+            <a:schemeClr val="accent1"/>
+          </a:effectRef>
+          <a:fontRef idx="minor">
+            <a:schemeClr val="lt1"/>
+          </a:fontRef>
+        </p:style>
+        <p:txBody>
+          <a:bodyPr rtlCol="0" anchor="ctr"/>
+          <a:lstStyle/>
+          <a:p>
+            <a:pPr algn="ctr"/>
+            <a:endParaRPr lang="it-IT"/>
+          </a:p>
+        </p:txBody>
+      </p:sp>
+      <p:sp>
+        <p:nvSpPr>
+          <p:cNvPr id="8" name="TextBox 7"/>
+          <p:cNvSpPr txBox="1"/>
+          <p:nvPr/>
+        </p:nvSpPr>
+        <p:spPr>
+          <a:xfrm>
+            <a:off x="1693652" y="4377110"/>
+            <a:ext cx="2375140" cy="461665"/>
+          </a:xfrm>
+          <a:prstGeom prst="rect">
+            <a:avLst/>
+          </a:prstGeom>
+          <a:noFill/>
+        </p:spPr>
+        <p:txBody>
+          <a:bodyPr wrap="square" rtlCol="0">
+            <a:spAutoFit/>
+          </a:bodyPr>
+          <a:lstStyle/>
+          <a:p>
+            <a:r>
+              <a:rPr lang="en-US" sz="2400" dirty="0" smtClean="0"/>
+              <a:t>Only 8 approved</a:t>
+            </a:r>
+            <a:endParaRPr lang="it-IT" sz="2400" dirty="0"/>
+          </a:p>
+        </p:txBody>
+      </p:sp>
+      <p:sp>
+        <p:nvSpPr>
+          <p:cNvPr id="9" name="Rounded Rectangle 8"/>
+          <p:cNvSpPr/>
+          <p:nvPr/>
+        </p:nvSpPr>
+        <p:spPr>
+          <a:xfrm>
+            <a:off x="7591245" y="4017034"/>
+            <a:ext cx="3140015" cy="1181819"/>
+          </a:xfrm>
+          <a:prstGeom prst="roundRect">
+            <a:avLst/>
+          </a:prstGeom>
+          <a:solidFill>
+            <a:srgbClr val="FF0000"/>
+          </a:solidFill>
+        </p:spPr>
+        <p:style>
+          <a:lnRef idx="2">
+            <a:schemeClr val="accent1">
+              <a:shade val="50000"/>
+            </a:schemeClr>
+          </a:lnRef>
+          <a:fillRef idx="1">
+            <a:schemeClr val="accent1"/>
+          </a:fillRef>
+          <a:effectRef idx="0">
+            <a:schemeClr val="accent1"/>
+          </a:effectRef>
+          <a:fontRef idx="minor">
+            <a:schemeClr val="lt1"/>
+          </a:fontRef>
+        </p:style>
+        <p:txBody>
+          <a:bodyPr rtlCol="0" anchor="ctr"/>
+          <a:lstStyle/>
+          <a:p>
+            <a:pPr algn="ctr"/>
+            <a:endParaRPr lang="it-IT"/>
+          </a:p>
+        </p:txBody>
+      </p:sp>
+      <p:sp>
+        <p:nvSpPr>
+          <p:cNvPr id="10" name="TextBox 9"/>
+          <p:cNvSpPr txBox="1"/>
+          <p:nvPr/>
+        </p:nvSpPr>
+        <p:spPr>
+          <a:xfrm>
+            <a:off x="8243976" y="4377110"/>
+            <a:ext cx="1834552" cy="461665"/>
+          </a:xfrm>
+          <a:prstGeom prst="rect">
+            <a:avLst/>
+          </a:prstGeom>
+          <a:noFill/>
+        </p:spPr>
+        <p:txBody>
+          <a:bodyPr wrap="square" rtlCol="0">
+            <a:spAutoFit/>
+          </a:bodyPr>
+          <a:lstStyle/>
+          <a:p>
+            <a:r>
+              <a:rPr lang="en-US" sz="2400" dirty="0" smtClean="0"/>
+              <a:t>14 Rejected</a:t>
+            </a:r>
+            <a:endParaRPr lang="it-IT" sz="2400" dirty="0"/>
+          </a:p>
+        </p:txBody>
+      </p:sp>
+      <p:cxnSp>
+        <p:nvCxnSpPr>
+          <p:cNvPr id="12" name="Straight Arrow Connector 11"/>
+          <p:cNvCxnSpPr/>
+          <p:nvPr/>
+        </p:nvCxnSpPr>
+        <p:spPr>
+          <a:xfrm flipH="1">
+            <a:off x="3019245" y="2932981"/>
+            <a:ext cx="1500997" cy="1017917"/>
+          </a:xfrm>
+          <a:prstGeom prst="straightConnector1">
+            <a:avLst/>
+          </a:prstGeom>
+          <a:ln w="28575">
+            <a:solidFill>
+              <a:srgbClr val="92D050"/>
+            </a:solidFill>
+            <a:tailEnd type="triangle"/>
+          </a:ln>
+        </p:spPr>
+        <p:style>
+          <a:lnRef idx="1">
+            <a:schemeClr val="accent1"/>
+          </a:lnRef>
+          <a:fillRef idx="0">
+            <a:schemeClr val="accent1"/>
+          </a:fillRef>
+          <a:effectRef idx="0">
+            <a:schemeClr val="accent1"/>
+          </a:effectRef>
+          <a:fontRef idx="minor">
+            <a:schemeClr val="tx1"/>
+          </a:fontRef>
+        </p:style>
+      </p:cxnSp>
+      <p:cxnSp>
+        <p:nvCxnSpPr>
+          <p:cNvPr id="14" name="Straight Arrow Connector 13"/>
+          <p:cNvCxnSpPr/>
+          <p:nvPr/>
+        </p:nvCxnSpPr>
+        <p:spPr>
+          <a:xfrm>
+            <a:off x="7591245" y="2932981"/>
+            <a:ext cx="1414732" cy="940279"/>
+          </a:xfrm>
+          <a:prstGeom prst="straightConnector1">
+            <a:avLst/>
+          </a:prstGeom>
+          <a:ln w="28575">
+            <a:solidFill>
+              <a:srgbClr val="FF0000"/>
+            </a:solidFill>
+            <a:tailEnd type="triangle"/>
+          </a:ln>
+        </p:spPr>
+        <p:style>
+          <a:lnRef idx="1">
+            <a:schemeClr val="accent1"/>
+          </a:lnRef>
+          <a:fillRef idx="0">
+            <a:schemeClr val="accent1"/>
+          </a:fillRef>
+          <a:effectRef idx="0">
+            <a:schemeClr val="accent1"/>
+          </a:effectRef>
+          <a:fontRef idx="minor">
+            <a:schemeClr val="tx1"/>
+          </a:fontRef>
+        </p:style>
+      </p:cxnSp>
+    </p:spTree>
+    <p:extLst>
+      <p:ext uri="{BB962C8B-B14F-4D97-AF65-F5344CB8AC3E}">
+        <p14:creationId xmlns:p14="http://schemas.microsoft.com/office/powerpoint/2010/main" val="2742220728"/>
+      </p:ext>
+    </p:extLst>
+  </p:cSld>
+  <p:clrMapOvr>
+    <a:masterClrMapping/>
+  </p:clrMapOvr>
+</p:sld>
+</file>
+
+<file path=ppt/slides/slide21.xml><?xml version="1.0" encoding="utf-8"?>
+<p:sld xmlns:a="http://schemas.openxmlformats.org/drawingml/2006/main" xmlns:r="http://schemas.openxmlformats.org/officeDocument/2006/relationships" xmlns:p="http://schemas.openxmlformats.org/presentationml/2006/main">
+  <p:cSld>
+    <p:spTree>
+      <p:nvGrpSpPr>
+        <p:cNvPr id="1" name=""/>
+        <p:cNvGrpSpPr/>
+        <p:nvPr/>
+      </p:nvGrpSpPr>
+      <p:grpSpPr>
+        <a:xfrm>
+          <a:off x="0" y="0"/>
+          <a:ext cx="0" cy="0"/>
+          <a:chOff x="0" y="0"/>
+          <a:chExt cx="0" cy="0"/>
+        </a:xfrm>
+      </p:grpSpPr>
+      <p:sp>
+        <p:nvSpPr>
+          <p:cNvPr id="2" name="Title 1"/>
+          <p:cNvSpPr>
+            <a:spLocks noGrp="1"/>
+          </p:cNvSpPr>
+          <p:nvPr>
+            <p:ph type="title"/>
+          </p:nvPr>
+        </p:nvSpPr>
+        <p:spPr>
+          <a:xfrm>
+            <a:off x="892542" y="123092"/>
+            <a:ext cx="10515600" cy="896815"/>
+          </a:xfrm>
+        </p:spPr>
+        <p:txBody>
+          <a:bodyPr/>
+          <a:lstStyle/>
+          <a:p>
+            <a:pPr algn="ctr"/>
+            <a:r>
+              <a:rPr lang="en-US" dirty="0" smtClean="0"/>
+              <a:t>Approved Bugs</a:t>
+            </a:r>
+            <a:endParaRPr lang="it-IT" dirty="0"/>
+          </a:p>
+        </p:txBody>
+      </p:sp>
+      <p:sp>
+        <p:nvSpPr>
+          <p:cNvPr id="3" name="Content Placeholder 2"/>
+          <p:cNvSpPr>
+            <a:spLocks noGrp="1"/>
+          </p:cNvSpPr>
+          <p:nvPr>
+            <p:ph sz="half" idx="2"/>
+          </p:nvPr>
+        </p:nvSpPr>
+        <p:spPr>
+          <a:xfrm>
+            <a:off x="296323" y="1690688"/>
+            <a:ext cx="5157787" cy="4318420"/>
+          </a:xfrm>
+        </p:spPr>
+        <p:txBody>
+          <a:bodyPr>
+            <a:normAutofit/>
+          </a:bodyPr>
+          <a:lstStyle/>
+          <a:p>
+            <a:pPr marL="514350" indent="-514350">
+              <a:buFont typeface="+mj-lt"/>
+              <a:buAutoNum type="arabicPeriod"/>
+            </a:pPr>
+            <a:endParaRPr lang="it-IT" dirty="0"/>
+          </a:p>
+          <a:p>
+            <a:pPr marL="514350" indent="-514350">
+              <a:buFont typeface="+mj-lt"/>
+              <a:buAutoNum type="arabicPeriod"/>
+            </a:pPr>
+            <a:endParaRPr lang="it-IT" dirty="0"/>
+          </a:p>
+        </p:txBody>
+      </p:sp>
+      <p:graphicFrame>
+        <p:nvGraphicFramePr>
+          <p:cNvPr id="10" name="Table 9"/>
+          <p:cNvGraphicFramePr>
+            <a:graphicFrameLocks noGrp="1"/>
+          </p:cNvGraphicFramePr>
+          <p:nvPr>
+            <p:extLst>
+              <p:ext uri="{D42A27DB-BD31-4B8C-83A1-F6EECF244321}">
+                <p14:modId xmlns:p14="http://schemas.microsoft.com/office/powerpoint/2010/main" val="2813843152"/>
+              </p:ext>
+            </p:extLst>
+          </p:nvPr>
+        </p:nvGraphicFramePr>
+        <p:xfrm>
+          <a:off x="248225" y="1097544"/>
+          <a:ext cx="11804233" cy="5355500"/>
+        </p:xfrm>
+        <a:graphic>
+          <a:graphicData uri="http://schemas.openxmlformats.org/drawingml/2006/table">
+            <a:tbl>
+              <a:tblPr firstRow="1" bandRow="1">
+                <a:tableStyleId>{68D230F3-CF80-4859-8CE7-A43EE81993B5}</a:tableStyleId>
+              </a:tblPr>
+              <a:tblGrid>
+                <a:gridCol w="624796"/>
+                <a:gridCol w="5657940"/>
+                <a:gridCol w="5521497"/>
+              </a:tblGrid>
+              <a:tr h="412053">
+                <a:tc>
+                  <a:txBody>
+                    <a:bodyPr/>
+                    <a:lstStyle/>
+                    <a:p>
+                      <a:r>
+                        <a:rPr lang="en-US" dirty="0" smtClean="0"/>
+                        <a:t>#</a:t>
+                      </a:r>
+                      <a:endParaRPr lang="it-IT" dirty="0"/>
+                    </a:p>
+                  </a:txBody>
+                  <a:tcPr/>
+                </a:tc>
+                <a:tc>
+                  <a:txBody>
+                    <a:bodyPr/>
+                    <a:lstStyle/>
+                    <a:p>
+                      <a:r>
+                        <a:rPr lang="en-US" dirty="0" smtClean="0"/>
+                        <a:t>Bug</a:t>
+                      </a:r>
+                      <a:endParaRPr lang="it-IT" dirty="0"/>
+                    </a:p>
+                  </a:txBody>
+                  <a:tcPr/>
+                </a:tc>
+                <a:tc>
+                  <a:txBody>
+                    <a:bodyPr/>
+                    <a:lstStyle/>
+                    <a:p>
+                      <a:r>
+                        <a:rPr lang="en-US" dirty="0" smtClean="0"/>
+                        <a:t>Cause</a:t>
+                      </a:r>
+                      <a:endParaRPr lang="it-IT" dirty="0"/>
+                    </a:p>
+                  </a:txBody>
+                  <a:tcPr/>
+                </a:tc>
+              </a:tr>
+              <a:tr h="475336">
+                <a:tc>
+                  <a:txBody>
+                    <a:bodyPr/>
+                    <a:lstStyle/>
+                    <a:p>
+                      <a:r>
+                        <a:rPr lang="en-US" dirty="0" smtClean="0"/>
+                        <a:t>1</a:t>
+                      </a:r>
+                      <a:endParaRPr lang="it-IT" dirty="0"/>
+                    </a:p>
+                  </a:txBody>
+                  <a:tcPr/>
+                </a:tc>
+                <a:tc>
+                  <a:txBody>
+                    <a:bodyPr/>
+                    <a:lstStyle/>
+                    <a:p>
+                      <a:pPr marL="0" marR="0" indent="0" algn="l" defTabSz="914400" rtl="0" eaLnBrk="1" fontAlgn="auto" latinLnBrk="0" hangingPunct="1">
+                        <a:lnSpc>
+                          <a:spcPct val="100000"/>
+                        </a:lnSpc>
+                        <a:spcBef>
+                          <a:spcPts val="0"/>
+                        </a:spcBef>
+                        <a:spcAft>
+                          <a:spcPts val="0"/>
+                        </a:spcAft>
+                        <a:buClrTx/>
+                        <a:buSzTx/>
+                        <a:buFontTx/>
+                        <a:buNone/>
+                        <a:tabLst/>
+                        <a:defRPr/>
+                      </a:pPr>
+                      <a:r>
+                        <a:rPr lang="en-US" dirty="0" smtClean="0"/>
+                        <a:t>Exception while starting Adversary game with negative depth</a:t>
+                      </a:r>
+                    </a:p>
+                  </a:txBody>
+                  <a:tcPr/>
+                </a:tc>
+                <a:tc>
+                  <a:txBody>
+                    <a:bodyPr/>
+                    <a:lstStyle/>
+                    <a:p>
+                      <a:r>
+                        <a:rPr lang="en-US" dirty="0" smtClean="0"/>
+                        <a:t>Due to misunderstanding</a:t>
+                      </a:r>
+                      <a:r>
+                        <a:rPr lang="en-US" baseline="0" dirty="0" smtClean="0"/>
+                        <a:t> message feature in VIEW was not working in main menu</a:t>
+                      </a:r>
+                      <a:endParaRPr lang="it-IT" dirty="0"/>
+                    </a:p>
+                  </a:txBody>
+                  <a:tcPr/>
+                </a:tc>
+              </a:tr>
+              <a:tr h="430823">
+                <a:tc>
+                  <a:txBody>
+                    <a:bodyPr/>
+                    <a:lstStyle/>
+                    <a:p>
+                      <a:r>
+                        <a:rPr lang="en-US" dirty="0" smtClean="0"/>
+                        <a:t>2</a:t>
+                      </a:r>
+                      <a:endParaRPr lang="it-IT" dirty="0"/>
+                    </a:p>
+                  </a:txBody>
+                  <a:tcPr/>
+                </a:tc>
+                <a:tc>
+                  <a:txBody>
+                    <a:bodyPr/>
+                    <a:lstStyle/>
+                    <a:p>
+                      <a:pPr marL="0" marR="0" indent="0" algn="l" defTabSz="914400" rtl="0" eaLnBrk="1" fontAlgn="auto" latinLnBrk="0" hangingPunct="1">
+                        <a:lnSpc>
+                          <a:spcPct val="100000"/>
+                        </a:lnSpc>
+                        <a:spcBef>
+                          <a:spcPts val="0"/>
+                        </a:spcBef>
+                        <a:spcAft>
+                          <a:spcPts val="0"/>
+                        </a:spcAft>
+                        <a:buClrTx/>
+                        <a:buSzTx/>
+                        <a:buFontTx/>
+                        <a:buNone/>
+                        <a:tabLst/>
+                        <a:defRPr/>
+                      </a:pPr>
+                      <a:r>
+                        <a:rPr lang="en-US" dirty="0" smtClean="0"/>
+                        <a:t>Exception while starting Adversary game with 0 depth</a:t>
+                      </a:r>
+                    </a:p>
+                  </a:txBody>
+                  <a:tcPr/>
+                </a:tc>
+                <a:tc>
+                  <a:txBody>
+                    <a:bodyPr/>
+                    <a:lstStyle/>
+                    <a:p>
+                      <a:r>
+                        <a:rPr lang="en-US" dirty="0" smtClean="0"/>
+                        <a:t>As point</a:t>
+                      </a:r>
+                      <a:r>
+                        <a:rPr lang="en-US" baseline="0" dirty="0" smtClean="0"/>
+                        <a:t> 1</a:t>
+                      </a:r>
+                      <a:endParaRPr lang="it-IT" dirty="0"/>
+                    </a:p>
+                  </a:txBody>
+                  <a:tcPr/>
+                </a:tc>
+              </a:tr>
+              <a:tr h="465992">
+                <a:tc>
+                  <a:txBody>
+                    <a:bodyPr/>
+                    <a:lstStyle/>
+                    <a:p>
+                      <a:r>
+                        <a:rPr lang="en-US" dirty="0" smtClean="0"/>
+                        <a:t>3</a:t>
+                      </a:r>
+                      <a:endParaRPr lang="it-IT" dirty="0"/>
+                    </a:p>
+                  </a:txBody>
+                  <a:tcPr/>
+                </a:tc>
+                <a:tc>
+                  <a:txBody>
+                    <a:bodyPr/>
+                    <a:lstStyle/>
+                    <a:p>
+                      <a:pPr marL="0" marR="0" indent="0" algn="l" defTabSz="914400" rtl="0" eaLnBrk="1" fontAlgn="auto" latinLnBrk="0" hangingPunct="1">
+                        <a:lnSpc>
+                          <a:spcPct val="100000"/>
+                        </a:lnSpc>
+                        <a:spcBef>
+                          <a:spcPts val="0"/>
+                        </a:spcBef>
+                        <a:spcAft>
+                          <a:spcPts val="0"/>
+                        </a:spcAft>
+                        <a:buClrTx/>
+                        <a:buSzTx/>
+                        <a:buFontTx/>
+                        <a:buNone/>
+                        <a:tabLst/>
+                        <a:defRPr/>
+                      </a:pPr>
+                      <a:r>
+                        <a:rPr lang="en-US" dirty="0" smtClean="0"/>
+                        <a:t>Can start Solitaire game with negative depth</a:t>
+                      </a:r>
+                    </a:p>
+                  </a:txBody>
+                  <a:tcPr/>
+                </a:tc>
+                <a:tc>
+                  <a:txBody>
+                    <a:bodyPr/>
+                    <a:lstStyle/>
+                    <a:p>
+                      <a:r>
+                        <a:rPr lang="en-US" dirty="0" smtClean="0"/>
+                        <a:t>Was working in Multithread</a:t>
+                      </a:r>
+                      <a:r>
+                        <a:rPr lang="en-US" baseline="0" dirty="0" smtClean="0"/>
+                        <a:t> but after switching to Single thread there was an error adapting the code because was not performed by the class developer</a:t>
+                      </a:r>
+                      <a:endParaRPr lang="it-IT" dirty="0"/>
+                    </a:p>
+                  </a:txBody>
+                  <a:tcPr/>
+                </a:tc>
+              </a:tr>
+              <a:tr h="413238">
+                <a:tc>
+                  <a:txBody>
+                    <a:bodyPr/>
+                    <a:lstStyle/>
+                    <a:p>
+                      <a:r>
+                        <a:rPr lang="en-US" dirty="0" smtClean="0"/>
+                        <a:t>4</a:t>
+                      </a:r>
+                      <a:endParaRPr lang="it-IT" dirty="0"/>
+                    </a:p>
+                  </a:txBody>
+                  <a:tcPr/>
+                </a:tc>
+                <a:tc>
+                  <a:txBody>
+                    <a:bodyPr/>
+                    <a:lstStyle/>
+                    <a:p>
+                      <a:pPr marL="0" marR="0" indent="0" algn="l" defTabSz="914400" rtl="0" eaLnBrk="1" fontAlgn="auto" latinLnBrk="0" hangingPunct="1">
+                        <a:lnSpc>
+                          <a:spcPct val="100000"/>
+                        </a:lnSpc>
+                        <a:spcBef>
+                          <a:spcPts val="0"/>
+                        </a:spcBef>
+                        <a:spcAft>
+                          <a:spcPts val="0"/>
+                        </a:spcAft>
+                        <a:buClrTx/>
+                        <a:buSzTx/>
+                        <a:buFontTx/>
+                        <a:buNone/>
+                        <a:tabLst/>
+                        <a:defRPr/>
+                      </a:pPr>
+                      <a:r>
+                        <a:rPr lang="en-US" dirty="0" smtClean="0"/>
+                        <a:t>Can start Solitaire game with negative step</a:t>
+                      </a:r>
+                    </a:p>
+                  </a:txBody>
+                  <a:tcPr/>
+                </a:tc>
+                <a:tc>
+                  <a:txBody>
+                    <a:bodyPr/>
+                    <a:lstStyle/>
+                    <a:p>
+                      <a:r>
+                        <a:rPr lang="en-US" dirty="0" smtClean="0"/>
+                        <a:t>As point 3</a:t>
+                      </a:r>
+                      <a:endParaRPr lang="it-IT" dirty="0"/>
+                    </a:p>
+                  </a:txBody>
+                  <a:tcPr/>
+                </a:tc>
+              </a:tr>
+              <a:tr h="534877">
+                <a:tc>
+                  <a:txBody>
+                    <a:bodyPr/>
+                    <a:lstStyle/>
+                    <a:p>
+                      <a:r>
+                        <a:rPr lang="en-US" dirty="0" smtClean="0"/>
+                        <a:t>5</a:t>
+                      </a:r>
+                      <a:endParaRPr lang="it-IT" dirty="0"/>
+                    </a:p>
+                  </a:txBody>
+                  <a:tcPr/>
+                </a:tc>
+                <a:tc>
+                  <a:txBody>
+                    <a:bodyPr/>
+                    <a:lstStyle/>
+                    <a:p>
+                      <a:pPr marL="0" marR="0" indent="0" algn="l" defTabSz="914400" rtl="0" eaLnBrk="1" fontAlgn="auto" latinLnBrk="0" hangingPunct="1">
+                        <a:lnSpc>
+                          <a:spcPct val="100000"/>
+                        </a:lnSpc>
+                        <a:spcBef>
+                          <a:spcPts val="0"/>
+                        </a:spcBef>
+                        <a:spcAft>
+                          <a:spcPts val="0"/>
+                        </a:spcAft>
+                        <a:buClrTx/>
+                        <a:buSzTx/>
+                        <a:buFontTx/>
+                        <a:buNone/>
+                        <a:tabLst/>
+                        <a:defRPr/>
+                      </a:pPr>
+                      <a:r>
+                        <a:rPr lang="en-US" dirty="0" smtClean="0"/>
+                        <a:t>Final values not shown in Adversary game</a:t>
+                      </a:r>
+                    </a:p>
+                  </a:txBody>
+                  <a:tcPr/>
+                </a:tc>
+                <a:tc>
+                  <a:txBody>
+                    <a:bodyPr/>
+                    <a:lstStyle/>
+                    <a:p>
+                      <a:r>
+                        <a:rPr lang="en-US" dirty="0" smtClean="0"/>
+                        <a:t>Final Value check did</a:t>
+                      </a:r>
+                      <a:r>
+                        <a:rPr lang="en-US" baseline="0" dirty="0" smtClean="0"/>
+                        <a:t> not update the view</a:t>
+                      </a:r>
+                      <a:endParaRPr lang="it-IT" dirty="0"/>
+                    </a:p>
+                  </a:txBody>
+                  <a:tcPr/>
+                </a:tc>
+              </a:tr>
+              <a:tr h="515066">
+                <a:tc>
+                  <a:txBody>
+                    <a:bodyPr/>
+                    <a:lstStyle/>
+                    <a:p>
+                      <a:r>
+                        <a:rPr lang="en-US" dirty="0" smtClean="0"/>
+                        <a:t>6</a:t>
+                      </a:r>
+                      <a:endParaRPr lang="it-IT" dirty="0"/>
+                    </a:p>
+                  </a:txBody>
+                  <a:tcPr/>
+                </a:tc>
+                <a:tc>
+                  <a:txBody>
+                    <a:bodyPr/>
+                    <a:lstStyle/>
+                    <a:p>
+                      <a:pPr marL="0" marR="0" indent="0" algn="l" defTabSz="914400" rtl="0" eaLnBrk="1" fontAlgn="auto" latinLnBrk="0" hangingPunct="1">
+                        <a:lnSpc>
+                          <a:spcPct val="100000"/>
+                        </a:lnSpc>
+                        <a:spcBef>
+                          <a:spcPts val="0"/>
+                        </a:spcBef>
+                        <a:spcAft>
+                          <a:spcPts val="0"/>
+                        </a:spcAft>
+                        <a:buClrTx/>
+                        <a:buSzTx/>
+                        <a:buFontTx/>
+                        <a:buNone/>
+                        <a:tabLst/>
+                        <a:defRPr/>
+                      </a:pPr>
+                      <a:r>
+                        <a:rPr lang="en-US" dirty="0" smtClean="0"/>
+                        <a:t>Label always shows “YOUR TURN” in Adversary Game</a:t>
+                      </a:r>
+                    </a:p>
+                  </a:txBody>
+                  <a:tcPr/>
+                </a:tc>
+                <a:tc>
+                  <a:txBody>
+                    <a:bodyPr/>
+                    <a:lstStyle/>
+                    <a:p>
+                      <a:r>
+                        <a:rPr lang="en-US" dirty="0" smtClean="0"/>
+                        <a:t>Should</a:t>
+                      </a:r>
+                      <a:r>
+                        <a:rPr lang="en-US" baseline="0" dirty="0" smtClean="0"/>
+                        <a:t> work in Multithread but using Single labels are updated only at the end of the function call (using buttons should solve it)</a:t>
+                      </a:r>
+                      <a:endParaRPr lang="it-IT" dirty="0"/>
+                    </a:p>
+                  </a:txBody>
+                  <a:tcPr/>
+                </a:tc>
+              </a:tr>
+              <a:tr h="485351">
+                <a:tc>
+                  <a:txBody>
+                    <a:bodyPr/>
+                    <a:lstStyle/>
+                    <a:p>
+                      <a:r>
+                        <a:rPr lang="en-US" dirty="0" smtClean="0"/>
+                        <a:t>7</a:t>
+                      </a:r>
+                      <a:endParaRPr lang="it-IT" dirty="0"/>
+                    </a:p>
+                  </a:txBody>
+                  <a:tcPr/>
+                </a:tc>
+                <a:tc>
+                  <a:txBody>
+                    <a:bodyPr/>
+                    <a:lstStyle/>
+                    <a:p>
+                      <a:r>
+                        <a:rPr lang="en-US" dirty="0" smtClean="0"/>
+                        <a:t>Holes buttons</a:t>
+                      </a:r>
+                      <a:r>
+                        <a:rPr lang="en-US" baseline="0" dirty="0" smtClean="0"/>
+                        <a:t> disabled after clicking on an empty one</a:t>
+                      </a:r>
+                      <a:endParaRPr lang="it-IT" dirty="0"/>
+                    </a:p>
+                  </a:txBody>
+                  <a:tcPr/>
+                </a:tc>
+                <a:tc>
+                  <a:txBody>
+                    <a:bodyPr/>
+                    <a:lstStyle/>
+                    <a:p>
+                      <a:r>
+                        <a:rPr lang="en-US" dirty="0" smtClean="0"/>
+                        <a:t>Blocking</a:t>
+                      </a:r>
+                      <a:r>
+                        <a:rPr lang="en-US" baseline="0" dirty="0" smtClean="0"/>
+                        <a:t> buttons should not be implemented in Single thread, was actually removed and solved but not merged</a:t>
+                      </a:r>
+                      <a:endParaRPr lang="it-IT" dirty="0"/>
+                    </a:p>
+                  </a:txBody>
+                  <a:tcPr/>
+                </a:tc>
+              </a:tr>
+              <a:tr h="455549">
+                <a:tc>
+                  <a:txBody>
+                    <a:bodyPr/>
+                    <a:lstStyle/>
+                    <a:p>
+                      <a:r>
+                        <a:rPr lang="en-US" dirty="0" smtClean="0"/>
+                        <a:t>8</a:t>
+                      </a:r>
+                      <a:endParaRPr lang="it-IT" dirty="0"/>
+                    </a:p>
+                  </a:txBody>
+                  <a:tcPr/>
+                </a:tc>
+                <a:tc>
+                  <a:txBody>
+                    <a:bodyPr/>
+                    <a:lstStyle/>
+                    <a:p>
+                      <a:r>
+                        <a:rPr lang="en-US" dirty="0" err="1" smtClean="0"/>
+                        <a:t>Negascout</a:t>
+                      </a:r>
+                      <a:r>
+                        <a:rPr lang="en-US" dirty="0" smtClean="0"/>
+                        <a:t> Exception</a:t>
+                      </a:r>
+                      <a:endParaRPr lang="it-IT" dirty="0"/>
+                    </a:p>
+                  </a:txBody>
+                  <a:tcPr/>
+                </a:tc>
+                <a:tc>
+                  <a:txBody>
+                    <a:bodyPr/>
+                    <a:lstStyle/>
+                    <a:p>
+                      <a:r>
+                        <a:rPr lang="en-US" dirty="0" smtClean="0"/>
+                        <a:t>Still unknown</a:t>
+                      </a:r>
+                      <a:endParaRPr lang="it-IT" dirty="0"/>
+                    </a:p>
+                  </a:txBody>
+                  <a:tcPr/>
+                </a:tc>
+              </a:tr>
+            </a:tbl>
+          </a:graphicData>
+        </a:graphic>
+      </p:graphicFrame>
+    </p:spTree>
+    <p:extLst>
+      <p:ext uri="{BB962C8B-B14F-4D97-AF65-F5344CB8AC3E}">
+        <p14:creationId xmlns:p14="http://schemas.microsoft.com/office/powerpoint/2010/main" val="2311295197"/>
+      </p:ext>
+    </p:extLst>
+  </p:cSld>
+  <p:clrMapOvr>
+    <a:masterClrMapping/>
+  </p:clrMapOvr>
 </p:sld>
 </file>
 

</xml_diff>

<commit_message>
added rejected bug slides
</commit_message>
<xml_diff>
--- a/Slides/massa/massa_slides.pptx
+++ b/Slides/massa/massa_slides.pptx
@@ -26,6 +26,7 @@
     <p:sldId id="275" r:id="rId20"/>
     <p:sldId id="276" r:id="rId21"/>
     <p:sldId id="277" r:id="rId22"/>
+    <p:sldId id="278" r:id="rId23"/>
   </p:sldIdLst>
   <p:sldSz cx="12192000" cy="6858000"/>
   <p:notesSz cx="6858000" cy="9144000"/>
@@ -6720,6 +6721,306 @@
 </p:sld>
 </file>
 
+<file path=ppt/slides/slide22.xml><?xml version="1.0" encoding="utf-8"?>
+<p:sld xmlns:a="http://schemas.openxmlformats.org/drawingml/2006/main" xmlns:r="http://schemas.openxmlformats.org/officeDocument/2006/relationships" xmlns:p="http://schemas.openxmlformats.org/presentationml/2006/main">
+  <p:cSld>
+    <p:spTree>
+      <p:nvGrpSpPr>
+        <p:cNvPr id="1" name=""/>
+        <p:cNvGrpSpPr/>
+        <p:nvPr/>
+      </p:nvGrpSpPr>
+      <p:grpSpPr>
+        <a:xfrm>
+          <a:off x="0" y="0"/>
+          <a:ext cx="0" cy="0"/>
+          <a:chOff x="0" y="0"/>
+          <a:chExt cx="0" cy="0"/>
+        </a:xfrm>
+      </p:grpSpPr>
+      <p:sp>
+        <p:nvSpPr>
+          <p:cNvPr id="2" name="Title 1"/>
+          <p:cNvSpPr>
+            <a:spLocks noGrp="1"/>
+          </p:cNvSpPr>
+          <p:nvPr>
+            <p:ph type="title"/>
+          </p:nvPr>
+        </p:nvSpPr>
+        <p:spPr>
+          <a:xfrm>
+            <a:off x="726702" y="134811"/>
+            <a:ext cx="10515600" cy="836762"/>
+          </a:xfrm>
+        </p:spPr>
+        <p:txBody>
+          <a:bodyPr/>
+          <a:lstStyle/>
+          <a:p>
+            <a:pPr algn="ctr"/>
+            <a:r>
+              <a:rPr lang="en-US" dirty="0" smtClean="0"/>
+              <a:t>Rejected </a:t>
+            </a:r>
+            <a:r>
+              <a:rPr lang="en-US" dirty="0" smtClean="0"/>
+              <a:t>Bugs</a:t>
+            </a:r>
+            <a:endParaRPr lang="it-IT" dirty="0"/>
+          </a:p>
+        </p:txBody>
+      </p:sp>
+      <p:sp>
+        <p:nvSpPr>
+          <p:cNvPr id="12" name="Content Placeholder 11"/>
+          <p:cNvSpPr>
+            <a:spLocks noGrp="1"/>
+          </p:cNvSpPr>
+          <p:nvPr>
+            <p:ph idx="1"/>
+          </p:nvPr>
+        </p:nvSpPr>
+        <p:spPr>
+          <a:xfrm>
+            <a:off x="176555" y="1803386"/>
+            <a:ext cx="3695554" cy="2371798"/>
+          </a:xfrm>
+        </p:spPr>
+        <p:txBody>
+          <a:bodyPr>
+            <a:normAutofit lnSpcReduction="10000"/>
+          </a:bodyPr>
+          <a:lstStyle/>
+          <a:p>
+            <a:pPr marL="0" indent="0">
+              <a:buNone/>
+            </a:pPr>
+            <a:r>
+              <a:rPr lang="en-US" b="1" dirty="0" smtClean="0"/>
+              <a:t>Main Reasons:</a:t>
+            </a:r>
+          </a:p>
+          <a:p>
+            <a:pPr marL="514350" indent="-514350">
+              <a:buFont typeface="+mj-lt"/>
+              <a:buAutoNum type="arabicPeriod"/>
+            </a:pPr>
+            <a:r>
+              <a:rPr lang="en-US" dirty="0" smtClean="0"/>
+              <a:t>Duplicates</a:t>
+            </a:r>
+          </a:p>
+          <a:p>
+            <a:pPr marL="514350" indent="-514350">
+              <a:buFont typeface="+mj-lt"/>
+              <a:buAutoNum type="arabicPeriod"/>
+            </a:pPr>
+            <a:r>
+              <a:rPr lang="en-US" dirty="0" smtClean="0"/>
+              <a:t>Bad Documentation</a:t>
+            </a:r>
+          </a:p>
+          <a:p>
+            <a:pPr marL="514350" indent="-514350">
+              <a:buFont typeface="+mj-lt"/>
+              <a:buAutoNum type="arabicPeriod"/>
+            </a:pPr>
+            <a:r>
+              <a:rPr lang="en-US" dirty="0" smtClean="0"/>
+              <a:t>Not a Bug</a:t>
+            </a:r>
+          </a:p>
+          <a:p>
+            <a:pPr marL="514350" indent="-514350">
+              <a:buFont typeface="+mj-lt"/>
+              <a:buAutoNum type="arabicPeriod"/>
+            </a:pPr>
+            <a:r>
+              <a:rPr lang="en-US" dirty="0" smtClean="0"/>
+              <a:t>Cannot replicate</a:t>
+            </a:r>
+          </a:p>
+        </p:txBody>
+      </p:sp>
+      <p:pic>
+        <p:nvPicPr>
+          <p:cNvPr id="6" name="Picture 5"/>
+          <p:cNvPicPr>
+            <a:picLocks noChangeAspect="1"/>
+          </p:cNvPicPr>
+          <p:nvPr/>
+        </p:nvPicPr>
+        <p:blipFill>
+          <a:blip r:embed="rId2">
+            <a:extLst>
+              <a:ext uri="{28A0092B-C50C-407E-A947-70E740481C1C}">
+                <a14:useLocalDpi xmlns:a14="http://schemas.microsoft.com/office/drawing/2010/main" val="0"/>
+              </a:ext>
+            </a:extLst>
+          </a:blip>
+          <a:stretch>
+            <a:fillRect/>
+          </a:stretch>
+        </p:blipFill>
+        <p:spPr>
+          <a:xfrm>
+            <a:off x="3770391" y="1262784"/>
+            <a:ext cx="4015740" cy="3703320"/>
+          </a:xfrm>
+          <a:prstGeom prst="rect">
+            <a:avLst/>
+          </a:prstGeom>
+        </p:spPr>
+      </p:pic>
+      <p:pic>
+        <p:nvPicPr>
+          <p:cNvPr id="11" name="Picture 10"/>
+          <p:cNvPicPr>
+            <a:picLocks noChangeAspect="1"/>
+          </p:cNvPicPr>
+          <p:nvPr/>
+        </p:nvPicPr>
+        <p:blipFill>
+          <a:blip r:embed="rId3">
+            <a:extLst>
+              <a:ext uri="{28A0092B-C50C-407E-A947-70E740481C1C}">
+                <a14:useLocalDpi xmlns:a14="http://schemas.microsoft.com/office/drawing/2010/main" val="0"/>
+              </a:ext>
+            </a:extLst>
+          </a:blip>
+          <a:stretch>
+            <a:fillRect/>
+          </a:stretch>
+        </p:blipFill>
+        <p:spPr>
+          <a:xfrm>
+            <a:off x="7990072" y="1262784"/>
+            <a:ext cx="3992880" cy="3756660"/>
+          </a:xfrm>
+          <a:prstGeom prst="rect">
+            <a:avLst/>
+          </a:prstGeom>
+        </p:spPr>
+      </p:pic>
+      <p:sp>
+        <p:nvSpPr>
+          <p:cNvPr id="13" name="TextBox 12"/>
+          <p:cNvSpPr txBox="1"/>
+          <p:nvPr/>
+        </p:nvSpPr>
+        <p:spPr>
+          <a:xfrm>
+            <a:off x="3817475" y="5079603"/>
+            <a:ext cx="3796774" cy="646331"/>
+          </a:xfrm>
+          <a:prstGeom prst="rect">
+            <a:avLst/>
+          </a:prstGeom>
+          <a:noFill/>
+        </p:spPr>
+        <p:txBody>
+          <a:bodyPr wrap="square" rtlCol="0">
+            <a:spAutoFit/>
+          </a:bodyPr>
+          <a:lstStyle/>
+          <a:p>
+            <a:r>
+              <a:rPr lang="en-US" dirty="0" smtClean="0"/>
+              <a:t>“Probably” infinite loop?</a:t>
+            </a:r>
+          </a:p>
+          <a:p>
+            <a:r>
+              <a:rPr lang="en-US" dirty="0" err="1" smtClean="0"/>
+              <a:t>COMMAND.execute</a:t>
+            </a:r>
+            <a:r>
+              <a:rPr lang="en-US" dirty="0" smtClean="0"/>
+              <a:t>?</a:t>
+            </a:r>
+            <a:endParaRPr lang="it-IT" dirty="0"/>
+          </a:p>
+        </p:txBody>
+      </p:sp>
+      <p:pic>
+        <p:nvPicPr>
+          <p:cNvPr id="15" name="Picture 14"/>
+          <p:cNvPicPr>
+            <a:picLocks noChangeAspect="1"/>
+          </p:cNvPicPr>
+          <p:nvPr/>
+        </p:nvPicPr>
+        <p:blipFill>
+          <a:blip r:embed="rId4">
+            <a:extLst>
+              <a:ext uri="{28A0092B-C50C-407E-A947-70E740481C1C}">
+                <a14:useLocalDpi xmlns:a14="http://schemas.microsoft.com/office/drawing/2010/main" val="0"/>
+              </a:ext>
+            </a:extLst>
+          </a:blip>
+          <a:stretch>
+            <a:fillRect/>
+          </a:stretch>
+        </p:blipFill>
+        <p:spPr>
+          <a:xfrm>
+            <a:off x="3631577" y="5839433"/>
+            <a:ext cx="3307080" cy="876300"/>
+          </a:xfrm>
+          <a:prstGeom prst="rect">
+            <a:avLst/>
+          </a:prstGeom>
+        </p:spPr>
+      </p:pic>
+      <p:sp>
+        <p:nvSpPr>
+          <p:cNvPr id="16" name="TextBox 15"/>
+          <p:cNvSpPr txBox="1"/>
+          <p:nvPr/>
+        </p:nvSpPr>
+        <p:spPr>
+          <a:xfrm>
+            <a:off x="8134709" y="5079603"/>
+            <a:ext cx="3848243" cy="646331"/>
+          </a:xfrm>
+          <a:prstGeom prst="rect">
+            <a:avLst/>
+          </a:prstGeom>
+          <a:noFill/>
+        </p:spPr>
+        <p:txBody>
+          <a:bodyPr wrap="square" rtlCol="0">
+            <a:spAutoFit/>
+          </a:bodyPr>
+          <a:lstStyle/>
+          <a:p>
+            <a:r>
+              <a:rPr lang="en-US" dirty="0" smtClean="0"/>
+              <a:t>Depth in which engine?</a:t>
+            </a:r>
+          </a:p>
+          <a:p>
+            <a:r>
+              <a:rPr lang="en-US" dirty="0" smtClean="0"/>
+              <a:t>Depth = 0 already reported first day</a:t>
+            </a:r>
+          </a:p>
+        </p:txBody>
+      </p:sp>
+    </p:spTree>
+    <p:extLst>
+      <p:ext uri="{BB962C8B-B14F-4D97-AF65-F5344CB8AC3E}">
+        <p14:creationId xmlns:p14="http://schemas.microsoft.com/office/powerpoint/2010/main" val="2087552035"/>
+      </p:ext>
+    </p:extLst>
+  </p:cSld>
+  <p:clrMapOvr>
+    <a:masterClrMapping/>
+  </p:clrMapOvr>
+</p:sld>
+</file>
+
 <file path=ppt/slides/slide3.xml><?xml version="1.0" encoding="utf-8"?>
 <p:sld xmlns:a="http://schemas.openxmlformats.org/drawingml/2006/main" xmlns:r="http://schemas.openxmlformats.org/officeDocument/2006/relationships" xmlns:p="http://schemas.openxmlformats.org/presentationml/2006/main">
   <p:cSld>

</xml_diff>

<commit_message>
Added foreign mates slides + corrections
</commit_message>
<xml_diff>
--- a/Slides/massa/massa_slides.pptx
+++ b/Slides/massa/massa_slides.pptx
@@ -27,6 +27,8 @@
     <p:sldId id="276" r:id="rId21"/>
     <p:sldId id="277" r:id="rId22"/>
     <p:sldId id="278" r:id="rId23"/>
+    <p:sldId id="279" r:id="rId24"/>
+    <p:sldId id="280" r:id="rId25"/>
   </p:sldIdLst>
   <p:sldSz cx="12192000" cy="6858000"/>
   <p:notesSz cx="6858000" cy="9144000"/>
@@ -3093,14 +3095,15 @@
         </p:nvSpPr>
         <p:spPr>
           <a:xfrm>
-            <a:off x="777815" y="63200"/>
-            <a:ext cx="10515600" cy="1325563"/>
+            <a:off x="777815" y="63201"/>
+            <a:ext cx="10515600" cy="977420"/>
           </a:xfrm>
         </p:spPr>
         <p:txBody>
           <a:bodyPr/>
           <a:lstStyle/>
           <a:p>
+            <a:pPr algn="ctr"/>
             <a:r>
               <a:rPr lang="en-US" dirty="0" smtClean="0"/>
               <a:t>Eiffel Configuration File .</a:t>
@@ -3125,13 +3128,13 @@
         </p:nvSpPr>
         <p:spPr>
           <a:xfrm>
-            <a:off x="545620" y="1006115"/>
-            <a:ext cx="10979989" cy="5066881"/>
+            <a:off x="282874" y="1040620"/>
+            <a:ext cx="11678010" cy="5455071"/>
           </a:xfrm>
         </p:spPr>
         <p:txBody>
           <a:bodyPr>
-            <a:normAutofit/>
+            <a:noAutofit/>
           </a:bodyPr>
           <a:lstStyle/>
           <a:p>
@@ -3142,7 +3145,7 @@
               <a:buNone/>
             </a:pPr>
             <a:r>
-              <a:rPr lang="en-US" sz="1200" dirty="0">
+              <a:rPr lang="en-US" sz="1400" dirty="0">
                 <a:cs typeface="Times New Roman" panose="02020603050405020304" pitchFamily="18" charset="0"/>
               </a:rPr>
               <a:t>&lt;?xml version="1.0" encoding="ISO-8859-1"?&gt;</a:t>
@@ -3156,115 +3159,115 @@
               <a:buNone/>
             </a:pPr>
             <a:r>
-              <a:rPr lang="en-US" sz="1200" dirty="0">
+              <a:rPr lang="en-US" sz="1400" dirty="0">
                 <a:cs typeface="Times New Roman" panose="02020603050405020304" pitchFamily="18" charset="0"/>
               </a:rPr>
               <a:t>&lt;system </a:t>
             </a:r>
             <a:r>
-              <a:rPr lang="en-US" sz="1200" dirty="0" err="1">
+              <a:rPr lang="en-US" sz="1400" dirty="0" err="1">
                 <a:cs typeface="Times New Roman" panose="02020603050405020304" pitchFamily="18" charset="0"/>
               </a:rPr>
               <a:t>xmlns</a:t>
             </a:r>
             <a:r>
-              <a:rPr lang="en-US" sz="1200" dirty="0">
+              <a:rPr lang="en-US" sz="1400" dirty="0">
                 <a:cs typeface="Times New Roman" panose="02020603050405020304" pitchFamily="18" charset="0"/>
               </a:rPr>
               <a:t>="http://www.eiffel.com/developers/xml/configuration-1-14-0" </a:t>
             </a:r>
             <a:r>
-              <a:rPr lang="en-US" sz="1200" dirty="0" err="1">
+              <a:rPr lang="en-US" sz="1400" dirty="0" err="1">
                 <a:cs typeface="Times New Roman" panose="02020603050405020304" pitchFamily="18" charset="0"/>
               </a:rPr>
               <a:t>xmlns:xsi</a:t>
             </a:r>
             <a:r>
-              <a:rPr lang="en-US" sz="1200" dirty="0">
+              <a:rPr lang="en-US" sz="1400" dirty="0">
                 <a:cs typeface="Times New Roman" panose="02020603050405020304" pitchFamily="18" charset="0"/>
               </a:rPr>
               <a:t>="http://www.w3.org/2001/XMLSchema-instance" </a:t>
             </a:r>
             <a:r>
-              <a:rPr lang="en-US" sz="1200" dirty="0" err="1">
+              <a:rPr lang="en-US" sz="1400" dirty="0" err="1">
                 <a:cs typeface="Times New Roman" panose="02020603050405020304" pitchFamily="18" charset="0"/>
               </a:rPr>
               <a:t>xsi:schemaLocation</a:t>
             </a:r>
             <a:r>
-              <a:rPr lang="en-US" sz="1200" dirty="0">
+              <a:rPr lang="en-US" sz="1400" dirty="0">
                 <a:cs typeface="Times New Roman" panose="02020603050405020304" pitchFamily="18" charset="0"/>
               </a:rPr>
               <a:t>="http://www.eiffel.com/developers/xml/configuration-1-14-0 http://www.eiffel.com/developers/xml/configuration-1-14-0.xsd" name="</a:t>
             </a:r>
             <a:r>
-              <a:rPr lang="en-US" sz="1200" dirty="0" err="1">
+              <a:rPr lang="en-US" sz="1400" dirty="0" err="1">
                 <a:cs typeface="Times New Roman" panose="02020603050405020304" pitchFamily="18" charset="0"/>
               </a:rPr>
               <a:t>eiffel</a:t>
             </a:r>
             <a:r>
-              <a:rPr lang="en-US" sz="1200" dirty="0">
+              <a:rPr lang="en-US" sz="1400" dirty="0">
                 <a:cs typeface="Times New Roman" panose="02020603050405020304" pitchFamily="18" charset="0"/>
               </a:rPr>
               <a:t>-</a:t>
             </a:r>
             <a:r>
-              <a:rPr lang="en-US" sz="1200" dirty="0" err="1">
+              <a:rPr lang="en-US" sz="1400" dirty="0" err="1">
                 <a:cs typeface="Times New Roman" panose="02020603050405020304" pitchFamily="18" charset="0"/>
               </a:rPr>
               <a:t>ai</a:t>
             </a:r>
             <a:r>
-              <a:rPr lang="en-US" sz="1200" dirty="0">
+              <a:rPr lang="en-US" sz="1400" dirty="0">
                 <a:cs typeface="Times New Roman" panose="02020603050405020304" pitchFamily="18" charset="0"/>
               </a:rPr>
               <a:t>-search" </a:t>
             </a:r>
             <a:r>
-              <a:rPr lang="en-US" sz="1200" dirty="0" err="1">
+              <a:rPr lang="en-US" sz="1400" dirty="0" err="1">
                 <a:cs typeface="Times New Roman" panose="02020603050405020304" pitchFamily="18" charset="0"/>
               </a:rPr>
               <a:t>uuid</a:t>
             </a:r>
             <a:r>
-              <a:rPr lang="en-US" sz="1200" dirty="0">
+              <a:rPr lang="en-US" sz="1400" dirty="0">
                 <a:cs typeface="Times New Roman" panose="02020603050405020304" pitchFamily="18" charset="0"/>
               </a:rPr>
               <a:t>="C7C425FB-CC6A-4F1D-A3D3-7765C54B8A0C" </a:t>
             </a:r>
             <a:r>
-              <a:rPr lang="en-US" sz="1200" dirty="0" err="1">
+              <a:rPr lang="en-US" sz="1400" dirty="0" err="1">
                 <a:cs typeface="Times New Roman" panose="02020603050405020304" pitchFamily="18" charset="0"/>
               </a:rPr>
               <a:t>library_target</a:t>
             </a:r>
             <a:r>
-              <a:rPr lang="en-US" sz="1200" dirty="0">
+              <a:rPr lang="en-US" sz="1400" dirty="0">
                 <a:cs typeface="Times New Roman" panose="02020603050405020304" pitchFamily="18" charset="0"/>
               </a:rPr>
               <a:t>="</a:t>
             </a:r>
             <a:r>
-              <a:rPr lang="en-US" sz="1200" dirty="0" err="1">
+              <a:rPr lang="en-US" sz="1400" dirty="0" err="1">
                 <a:cs typeface="Times New Roman" panose="02020603050405020304" pitchFamily="18" charset="0"/>
               </a:rPr>
               <a:t>eiffel</a:t>
             </a:r>
             <a:r>
-              <a:rPr lang="en-US" sz="1200" dirty="0">
+              <a:rPr lang="en-US" sz="1400" dirty="0">
                 <a:cs typeface="Times New Roman" panose="02020603050405020304" pitchFamily="18" charset="0"/>
               </a:rPr>
               <a:t>-</a:t>
             </a:r>
             <a:r>
-              <a:rPr lang="en-US" sz="1200" dirty="0" err="1">
+              <a:rPr lang="en-US" sz="1400" dirty="0" err="1">
                 <a:cs typeface="Times New Roman" panose="02020603050405020304" pitchFamily="18" charset="0"/>
               </a:rPr>
               <a:t>ai</a:t>
             </a:r>
             <a:r>
-              <a:rPr lang="en-US" sz="1200" dirty="0">
+              <a:rPr lang="en-US" sz="1400" dirty="0">
                 <a:cs typeface="Times New Roman" panose="02020603050405020304" pitchFamily="18" charset="0"/>
               </a:rPr>
               <a:t>-search"&gt;</a:t>
@@ -3278,31 +3281,31 @@
               <a:buNone/>
             </a:pPr>
             <a:r>
-              <a:rPr lang="en-US" sz="1200" dirty="0">
+              <a:rPr lang="en-US" sz="1400" dirty="0">
                 <a:cs typeface="Times New Roman" panose="02020603050405020304" pitchFamily="18" charset="0"/>
               </a:rPr>
               <a:t>	&lt;target name="</a:t>
             </a:r>
             <a:r>
-              <a:rPr lang="en-US" sz="1200" dirty="0" err="1">
+              <a:rPr lang="en-US" sz="1400" dirty="0" err="1">
                 <a:cs typeface="Times New Roman" panose="02020603050405020304" pitchFamily="18" charset="0"/>
               </a:rPr>
               <a:t>eiffel</a:t>
             </a:r>
             <a:r>
-              <a:rPr lang="en-US" sz="1200" dirty="0">
+              <a:rPr lang="en-US" sz="1400" dirty="0">
                 <a:cs typeface="Times New Roman" panose="02020603050405020304" pitchFamily="18" charset="0"/>
               </a:rPr>
               <a:t>-</a:t>
             </a:r>
             <a:r>
-              <a:rPr lang="en-US" sz="1200" dirty="0" err="1">
+              <a:rPr lang="en-US" sz="1400" dirty="0" err="1">
                 <a:cs typeface="Times New Roman" panose="02020603050405020304" pitchFamily="18" charset="0"/>
               </a:rPr>
               <a:t>ai</a:t>
             </a:r>
             <a:r>
-              <a:rPr lang="en-US" sz="1200" dirty="0">
+              <a:rPr lang="en-US" sz="1400" dirty="0">
                 <a:cs typeface="Times New Roman" panose="02020603050405020304" pitchFamily="18" charset="0"/>
               </a:rPr>
               <a:t>-search"&gt;</a:t>
@@ -3316,13 +3319,13 @@
               <a:buNone/>
             </a:pPr>
             <a:r>
-              <a:rPr lang="en-US" sz="1200" dirty="0">
+              <a:rPr lang="en-US" sz="1400" dirty="0">
                 <a:cs typeface="Times New Roman" panose="02020603050405020304" pitchFamily="18" charset="0"/>
               </a:rPr>
               <a:t>		</a:t>
             </a:r>
             <a:r>
-              <a:rPr lang="en-US" sz="1200" dirty="0">
+              <a:rPr lang="en-US" sz="1400" dirty="0">
                 <a:solidFill>
                   <a:srgbClr val="FF0000"/>
                 </a:solidFill>
@@ -3331,7 +3334,7 @@
               <a:t>&lt;root </a:t>
             </a:r>
             <a:r>
-              <a:rPr lang="en-US" sz="1200" dirty="0" err="1">
+              <a:rPr lang="en-US" sz="1400" dirty="0" err="1">
                 <a:solidFill>
                   <a:srgbClr val="FF0000"/>
                 </a:solidFill>
@@ -3340,7 +3343,7 @@
               <a:t>all_classes</a:t>
             </a:r>
             <a:r>
-              <a:rPr lang="en-US" sz="1200" dirty="0">
+              <a:rPr lang="en-US" sz="1400" dirty="0">
                 <a:solidFill>
                   <a:srgbClr val="FF0000"/>
                 </a:solidFill>
@@ -3357,31 +3360,31 @@
               <a:buNone/>
             </a:pPr>
             <a:r>
-              <a:rPr lang="en-US" sz="1200" dirty="0">
+              <a:rPr lang="en-US" sz="1400" dirty="0">
                 <a:cs typeface="Times New Roman" panose="02020603050405020304" pitchFamily="18" charset="0"/>
               </a:rPr>
               <a:t>		&lt;option warning="true" </a:t>
             </a:r>
             <a:r>
-              <a:rPr lang="en-US" sz="1200" dirty="0" err="1">
+              <a:rPr lang="en-US" sz="1400" dirty="0" err="1">
                 <a:cs typeface="Times New Roman" panose="02020603050405020304" pitchFamily="18" charset="0"/>
               </a:rPr>
               <a:t>is_attached_by_default</a:t>
             </a:r>
             <a:r>
-              <a:rPr lang="en-US" sz="1200" dirty="0">
+              <a:rPr lang="en-US" sz="1400" dirty="0">
                 <a:cs typeface="Times New Roman" panose="02020603050405020304" pitchFamily="18" charset="0"/>
               </a:rPr>
               <a:t>="false" </a:t>
             </a:r>
             <a:r>
-              <a:rPr lang="en-US" sz="1200" dirty="0" err="1">
+              <a:rPr lang="en-US" sz="1400" dirty="0" err="1">
                 <a:cs typeface="Times New Roman" panose="02020603050405020304" pitchFamily="18" charset="0"/>
               </a:rPr>
               <a:t>void_safety</a:t>
             </a:r>
             <a:r>
-              <a:rPr lang="en-US" sz="1200" dirty="0">
+              <a:rPr lang="en-US" sz="1400" dirty="0">
                 <a:cs typeface="Times New Roman" panose="02020603050405020304" pitchFamily="18" charset="0"/>
               </a:rPr>
               <a:t>="none"&gt;</a:t>
@@ -3395,31 +3398,31 @@
               <a:buNone/>
             </a:pPr>
             <a:r>
-              <a:rPr lang="en-US" sz="1200" dirty="0">
+              <a:rPr lang="en-US" sz="1400" dirty="0">
                 <a:cs typeface="Times New Roman" panose="02020603050405020304" pitchFamily="18" charset="0"/>
               </a:rPr>
               <a:t>			&lt;assertions precondition="true" </a:t>
             </a:r>
             <a:r>
-              <a:rPr lang="en-US" sz="1200" dirty="0" err="1">
+              <a:rPr lang="en-US" sz="1400" dirty="0" err="1">
                 <a:cs typeface="Times New Roman" panose="02020603050405020304" pitchFamily="18" charset="0"/>
               </a:rPr>
               <a:t>postcondition</a:t>
             </a:r>
             <a:r>
-              <a:rPr lang="en-US" sz="1200" dirty="0">
+              <a:rPr lang="en-US" sz="1400" dirty="0">
                 <a:cs typeface="Times New Roman" panose="02020603050405020304" pitchFamily="18" charset="0"/>
               </a:rPr>
               <a:t>="true" check="true" invariant="true" loop="true" </a:t>
             </a:r>
             <a:r>
-              <a:rPr lang="en-US" sz="1200" dirty="0" err="1">
+              <a:rPr lang="en-US" sz="1400" dirty="0" err="1">
                 <a:cs typeface="Times New Roman" panose="02020603050405020304" pitchFamily="18" charset="0"/>
               </a:rPr>
               <a:t>supplier_precondition</a:t>
             </a:r>
             <a:r>
-              <a:rPr lang="en-US" sz="1200" dirty="0">
+              <a:rPr lang="en-US" sz="1400" dirty="0">
                 <a:cs typeface="Times New Roman" panose="02020603050405020304" pitchFamily="18" charset="0"/>
               </a:rPr>
               <a:t>="true"/&gt;</a:t>
@@ -3433,7 +3436,7 @@
               <a:buNone/>
             </a:pPr>
             <a:r>
-              <a:rPr lang="en-US" sz="1200" dirty="0">
+              <a:rPr lang="en-US" sz="1400" dirty="0">
                 <a:cs typeface="Times New Roman" panose="02020603050405020304" pitchFamily="18" charset="0"/>
               </a:rPr>
               <a:t>		&lt;/option&gt;</a:t>
@@ -3447,19 +3450,19 @@
               <a:buNone/>
             </a:pPr>
             <a:r>
-              <a:rPr lang="en-US" sz="1200" dirty="0">
+              <a:rPr lang="en-US" sz="1400" dirty="0">
                 <a:cs typeface="Times New Roman" panose="02020603050405020304" pitchFamily="18" charset="0"/>
               </a:rPr>
               <a:t>		&lt;setting name="</a:t>
             </a:r>
             <a:r>
-              <a:rPr lang="en-US" sz="1200" dirty="0" err="1">
+              <a:rPr lang="en-US" sz="1400" dirty="0" err="1">
                 <a:cs typeface="Times New Roman" panose="02020603050405020304" pitchFamily="18" charset="0"/>
               </a:rPr>
               <a:t>console_application</a:t>
             </a:r>
             <a:r>
-              <a:rPr lang="en-US" sz="1200" dirty="0">
+              <a:rPr lang="en-US" sz="1400" dirty="0">
                 <a:cs typeface="Times New Roman" panose="02020603050405020304" pitchFamily="18" charset="0"/>
               </a:rPr>
               <a:t>" value="true"/&gt;</a:t>
@@ -3473,13 +3476,13 @@
               <a:buNone/>
             </a:pPr>
             <a:r>
-              <a:rPr lang="en-US" sz="1200" dirty="0">
+              <a:rPr lang="en-US" sz="1400" dirty="0">
                 <a:cs typeface="Times New Roman" panose="02020603050405020304" pitchFamily="18" charset="0"/>
               </a:rPr>
               <a:t>		</a:t>
             </a:r>
             <a:r>
-              <a:rPr lang="en-US" sz="1200" dirty="0">
+              <a:rPr lang="en-US" sz="1400" dirty="0">
                 <a:solidFill>
                   <a:schemeClr val="accent1">
                     <a:lumMod val="75000"/>
@@ -3490,7 +3493,7 @@
               <a:t>&lt;library name="base" location="$ISE_LIBRARY\library\base\</a:t>
             </a:r>
             <a:r>
-              <a:rPr lang="en-US" sz="1200" dirty="0" err="1">
+              <a:rPr lang="en-US" sz="1400" dirty="0" err="1">
                 <a:solidFill>
                   <a:schemeClr val="accent1">
                     <a:lumMod val="75000"/>
@@ -3501,7 +3504,7 @@
               <a:t>base.ecf</a:t>
             </a:r>
             <a:r>
-              <a:rPr lang="en-US" sz="1200" dirty="0">
+              <a:rPr lang="en-US" sz="1400" dirty="0">
                 <a:solidFill>
                   <a:schemeClr val="accent1">
                     <a:lumMod val="75000"/>
@@ -3520,7 +3523,7 @@
               <a:buNone/>
             </a:pPr>
             <a:r>
-              <a:rPr lang="en-US" sz="1200" dirty="0">
+              <a:rPr lang="en-US" sz="1400" dirty="0">
                 <a:solidFill>
                   <a:schemeClr val="accent1">
                     <a:lumMod val="75000"/>
@@ -3531,7 +3534,7 @@
               <a:t>		&lt;library name="testing" location="$ISE_LIBRARY\library\testing\</a:t>
             </a:r>
             <a:r>
-              <a:rPr lang="en-US" sz="1200" dirty="0" err="1">
+              <a:rPr lang="en-US" sz="1400" dirty="0" err="1">
                 <a:solidFill>
                   <a:schemeClr val="accent1">
                     <a:lumMod val="75000"/>
@@ -3542,7 +3545,7 @@
               <a:t>testing.ecf</a:t>
             </a:r>
             <a:r>
-              <a:rPr lang="en-US" sz="1200" dirty="0">
+              <a:rPr lang="en-US" sz="1400" dirty="0">
                 <a:solidFill>
                   <a:schemeClr val="accent1">
                     <a:lumMod val="75000"/>
@@ -3561,13 +3564,13 @@
               <a:buNone/>
             </a:pPr>
             <a:r>
-              <a:rPr lang="en-US" sz="1200" dirty="0">
+              <a:rPr lang="en-US" sz="1400" dirty="0">
                 <a:cs typeface="Times New Roman" panose="02020603050405020304" pitchFamily="18" charset="0"/>
               </a:rPr>
               <a:t>		</a:t>
             </a:r>
             <a:r>
-              <a:rPr lang="en-US" sz="1200" dirty="0">
+              <a:rPr lang="en-US" sz="1400" dirty="0">
                 <a:solidFill>
                   <a:srgbClr val="00B050"/>
                 </a:solidFill>
@@ -3576,7 +3579,7 @@
               <a:t>&lt;cluster name="</a:t>
             </a:r>
             <a:r>
-              <a:rPr lang="en-US" sz="1200" dirty="0" err="1">
+              <a:rPr lang="en-US" sz="1400" dirty="0" err="1">
                 <a:solidFill>
                   <a:srgbClr val="00B050"/>
                 </a:solidFill>
@@ -3585,7 +3588,7 @@
               <a:t>eiffel</a:t>
             </a:r>
             <a:r>
-              <a:rPr lang="en-US" sz="1200" dirty="0">
+              <a:rPr lang="en-US" sz="1400" dirty="0">
                 <a:solidFill>
                   <a:srgbClr val="00B050"/>
                 </a:solidFill>
@@ -3594,7 +3597,7 @@
               <a:t>-</a:t>
             </a:r>
             <a:r>
-              <a:rPr lang="en-US" sz="1200" dirty="0" err="1">
+              <a:rPr lang="en-US" sz="1400" dirty="0" err="1">
                 <a:solidFill>
                   <a:srgbClr val="00B050"/>
                 </a:solidFill>
@@ -3603,7 +3606,7 @@
               <a:t>ai</a:t>
             </a:r>
             <a:r>
-              <a:rPr lang="en-US" sz="1200" dirty="0">
+              <a:rPr lang="en-US" sz="1400" dirty="0">
                 <a:solidFill>
                   <a:srgbClr val="00B050"/>
                 </a:solidFill>
@@ -3620,7 +3623,7 @@
               <a:buNone/>
             </a:pPr>
             <a:r>
-              <a:rPr lang="en-US" sz="1200" dirty="0">
+              <a:rPr lang="en-US" sz="1400" dirty="0">
                 <a:solidFill>
                   <a:srgbClr val="00B050"/>
                 </a:solidFill>
@@ -3629,7 +3632,7 @@
               <a:t>			&lt;</a:t>
             </a:r>
             <a:r>
-              <a:rPr lang="en-US" sz="1200" dirty="0" err="1">
+              <a:rPr lang="en-US" sz="1400" dirty="0" err="1">
                 <a:solidFill>
                   <a:srgbClr val="00B050"/>
                 </a:solidFill>
@@ -3638,7 +3641,7 @@
               <a:t>file_rule</a:t>
             </a:r>
             <a:r>
-              <a:rPr lang="en-US" sz="1200" dirty="0">
+              <a:rPr lang="en-US" sz="1400" dirty="0">
                 <a:solidFill>
                   <a:srgbClr val="00B050"/>
                 </a:solidFill>
@@ -3655,7 +3658,7 @@
               <a:buNone/>
             </a:pPr>
             <a:r>
-              <a:rPr lang="en-US" sz="1200" dirty="0">
+              <a:rPr lang="en-US" sz="1400" dirty="0">
                 <a:solidFill>
                   <a:srgbClr val="00B050"/>
                 </a:solidFill>
@@ -3672,7 +3675,7 @@
               <a:buNone/>
             </a:pPr>
             <a:r>
-              <a:rPr lang="en-US" sz="1200" dirty="0">
+              <a:rPr lang="en-US" sz="1400" dirty="0">
                 <a:solidFill>
                   <a:srgbClr val="00B050"/>
                 </a:solidFill>
@@ -3689,7 +3692,7 @@
               <a:buNone/>
             </a:pPr>
             <a:r>
-              <a:rPr lang="en-US" sz="1200" dirty="0">
+              <a:rPr lang="en-US" sz="1400" dirty="0">
                 <a:solidFill>
                   <a:srgbClr val="00B050"/>
                 </a:solidFill>
@@ -3698,7 +3701,7 @@
               <a:t>				&lt;exclude&gt;/.</a:t>
             </a:r>
             <a:r>
-              <a:rPr lang="en-US" sz="1200" dirty="0" err="1">
+              <a:rPr lang="en-US" sz="1400" dirty="0" err="1">
                 <a:solidFill>
                   <a:srgbClr val="00B050"/>
                 </a:solidFill>
@@ -3707,7 +3710,7 @@
               <a:t>svn</a:t>
             </a:r>
             <a:r>
-              <a:rPr lang="en-US" sz="1200" dirty="0">
+              <a:rPr lang="en-US" sz="1400" dirty="0">
                 <a:solidFill>
                   <a:srgbClr val="00B050"/>
                 </a:solidFill>
@@ -3724,7 +3727,7 @@
               <a:buNone/>
             </a:pPr>
             <a:r>
-              <a:rPr lang="en-US" sz="1200" dirty="0">
+              <a:rPr lang="en-US" sz="1400" dirty="0">
                 <a:solidFill>
                   <a:srgbClr val="00B050"/>
                 </a:solidFill>
@@ -3733,7 +3736,7 @@
               <a:t>			&lt;/</a:t>
             </a:r>
             <a:r>
-              <a:rPr lang="en-US" sz="1200" dirty="0" err="1">
+              <a:rPr lang="en-US" sz="1400" dirty="0" err="1">
                 <a:solidFill>
                   <a:srgbClr val="00B050"/>
                 </a:solidFill>
@@ -3742,7 +3745,7 @@
               <a:t>file_rule</a:t>
             </a:r>
             <a:r>
-              <a:rPr lang="en-US" sz="1200" dirty="0">
+              <a:rPr lang="en-US" sz="1400" dirty="0">
                 <a:solidFill>
                   <a:srgbClr val="00B050"/>
                 </a:solidFill>
@@ -3759,7 +3762,7 @@
               <a:buNone/>
             </a:pPr>
             <a:r>
-              <a:rPr lang="en-US" sz="1200" dirty="0">
+              <a:rPr lang="en-US" sz="1400" dirty="0">
                 <a:solidFill>
                   <a:srgbClr val="00B050"/>
                 </a:solidFill>
@@ -3768,7 +3771,7 @@
               <a:t>			&lt;cluster name="single-agent-search" location=".\</a:t>
             </a:r>
             <a:r>
-              <a:rPr lang="en-US" sz="1200" dirty="0" err="1">
+              <a:rPr lang="en-US" sz="1400" dirty="0" err="1">
                 <a:solidFill>
                   <a:srgbClr val="00B050"/>
                 </a:solidFill>
@@ -3777,7 +3780,7 @@
               <a:t>single_agent_search</a:t>
             </a:r>
             <a:r>
-              <a:rPr lang="en-US" sz="1200" dirty="0">
+              <a:rPr lang="en-US" sz="1400" dirty="0">
                 <a:solidFill>
                   <a:srgbClr val="00B050"/>
                 </a:solidFill>
@@ -3794,7 +3797,7 @@
               <a:buNone/>
             </a:pPr>
             <a:r>
-              <a:rPr lang="en-US" sz="1200" dirty="0">
+              <a:rPr lang="en-US" sz="1400" dirty="0">
                 <a:solidFill>
                   <a:srgbClr val="00B050"/>
                 </a:solidFill>
@@ -3803,7 +3806,7 @@
               <a:t>			&lt;cluster name="single-agent-search-engines" location=".\</a:t>
             </a:r>
             <a:r>
-              <a:rPr lang="en-US" sz="1200" dirty="0" err="1">
+              <a:rPr lang="en-US" sz="1400" dirty="0" err="1">
                 <a:solidFill>
                   <a:srgbClr val="00B050"/>
                 </a:solidFill>
@@ -3812,7 +3815,7 @@
               <a:t>single_agent_search</a:t>
             </a:r>
             <a:r>
-              <a:rPr lang="en-US" sz="1200" dirty="0">
+              <a:rPr lang="en-US" sz="1400" dirty="0">
                 <a:solidFill>
                   <a:srgbClr val="00B050"/>
                 </a:solidFill>
@@ -3821,7 +3824,7 @@
               <a:t>\</a:t>
             </a:r>
             <a:r>
-              <a:rPr lang="en-US" sz="1200" dirty="0" err="1">
+              <a:rPr lang="en-US" sz="1400" dirty="0" err="1">
                 <a:solidFill>
                   <a:srgbClr val="00B050"/>
                 </a:solidFill>
@@ -3830,7 +3833,7 @@
               <a:t>single_agent_search_engines</a:t>
             </a:r>
             <a:r>
-              <a:rPr lang="en-US" sz="1200" dirty="0">
+              <a:rPr lang="en-US" sz="1400" dirty="0">
                 <a:solidFill>
                   <a:srgbClr val="00B050"/>
                 </a:solidFill>
@@ -3847,7 +3850,7 @@
               <a:buNone/>
             </a:pPr>
             <a:r>
-              <a:rPr lang="en-US" sz="1200" dirty="0">
+              <a:rPr lang="en-US" sz="1400" dirty="0">
                 <a:solidFill>
                   <a:srgbClr val="00B050"/>
                 </a:solidFill>
@@ -3856,7 +3859,7 @@
               <a:t>			&lt;cluster name="single-agent-search-examples" location=".\</a:t>
             </a:r>
             <a:r>
-              <a:rPr lang="en-US" sz="1200" dirty="0" err="1">
+              <a:rPr lang="en-US" sz="1400" dirty="0" err="1">
                 <a:solidFill>
                   <a:srgbClr val="00B050"/>
                 </a:solidFill>
@@ -3865,7 +3868,7 @@
               <a:t>single_agent_search_examples</a:t>
             </a:r>
             <a:r>
-              <a:rPr lang="en-US" sz="1200" dirty="0">
+              <a:rPr lang="en-US" sz="1400" dirty="0">
                 <a:solidFill>
                   <a:srgbClr val="00B050"/>
                 </a:solidFill>
@@ -3882,7 +3885,7 @@
               <a:buNone/>
             </a:pPr>
             <a:r>
-              <a:rPr lang="en-US" sz="1200" dirty="0">
+              <a:rPr lang="en-US" sz="1400" dirty="0">
                 <a:solidFill>
                   <a:srgbClr val="00B050"/>
                 </a:solidFill>
@@ -3891,7 +3894,7 @@
               <a:t>			&lt;cluster name="adversary-search" location=".\</a:t>
             </a:r>
             <a:r>
-              <a:rPr lang="en-US" sz="1200" dirty="0" err="1">
+              <a:rPr lang="en-US" sz="1400" dirty="0" err="1">
                 <a:solidFill>
                   <a:srgbClr val="00B050"/>
                 </a:solidFill>
@@ -3900,7 +3903,7 @@
               <a:t>adversary_search</a:t>
             </a:r>
             <a:r>
-              <a:rPr lang="en-US" sz="1200" dirty="0">
+              <a:rPr lang="en-US" sz="1400" dirty="0">
                 <a:solidFill>
                   <a:srgbClr val="00B050"/>
                 </a:solidFill>
@@ -3917,7 +3920,7 @@
               <a:buNone/>
             </a:pPr>
             <a:r>
-              <a:rPr lang="en-US" sz="1200" dirty="0">
+              <a:rPr lang="en-US" sz="1400" dirty="0">
                 <a:solidFill>
                   <a:srgbClr val="00B050"/>
                 </a:solidFill>
@@ -3926,7 +3929,7 @@
               <a:t>			&lt;cluster name="adversary-search-engines" location=".\</a:t>
             </a:r>
             <a:r>
-              <a:rPr lang="en-US" sz="1200" dirty="0" err="1">
+              <a:rPr lang="en-US" sz="1400" dirty="0" err="1">
                 <a:solidFill>
                   <a:srgbClr val="00B050"/>
                 </a:solidFill>
@@ -3935,7 +3938,7 @@
               <a:t>adversary_search</a:t>
             </a:r>
             <a:r>
-              <a:rPr lang="en-US" sz="1200" dirty="0">
+              <a:rPr lang="en-US" sz="1400" dirty="0">
                 <a:solidFill>
                   <a:srgbClr val="00B050"/>
                 </a:solidFill>
@@ -3944,7 +3947,7 @@
               <a:t>\</a:t>
             </a:r>
             <a:r>
-              <a:rPr lang="en-US" sz="1200" dirty="0" err="1">
+              <a:rPr lang="en-US" sz="1400" dirty="0" err="1">
                 <a:solidFill>
                   <a:srgbClr val="00B050"/>
                 </a:solidFill>
@@ -3953,7 +3956,7 @@
               <a:t>adversary_search_engines</a:t>
             </a:r>
             <a:r>
-              <a:rPr lang="en-US" sz="1200" dirty="0">
+              <a:rPr lang="en-US" sz="1400" dirty="0">
                 <a:solidFill>
                   <a:srgbClr val="00B050"/>
                 </a:solidFill>
@@ -3970,7 +3973,7 @@
               <a:buNone/>
             </a:pPr>
             <a:r>
-              <a:rPr lang="en-US" sz="1200" dirty="0">
+              <a:rPr lang="en-US" sz="1400" dirty="0">
                 <a:solidFill>
                   <a:srgbClr val="00B050"/>
                 </a:solidFill>
@@ -3979,7 +3982,7 @@
               <a:t>			&lt;cluster name="adversary-search-examples" location=".\</a:t>
             </a:r>
             <a:r>
-              <a:rPr lang="en-US" sz="1200" dirty="0" err="1">
+              <a:rPr lang="en-US" sz="1400" dirty="0" err="1">
                 <a:solidFill>
                   <a:srgbClr val="00B050"/>
                 </a:solidFill>
@@ -3988,7 +3991,7 @@
               <a:t>adversary_search_examples</a:t>
             </a:r>
             <a:r>
-              <a:rPr lang="en-US" sz="1200" dirty="0">
+              <a:rPr lang="en-US" sz="1400" dirty="0">
                 <a:solidFill>
                   <a:srgbClr val="00B050"/>
                 </a:solidFill>
@@ -4005,7 +4008,7 @@
               <a:buNone/>
             </a:pPr>
             <a:r>
-              <a:rPr lang="en-US" sz="1200" dirty="0">
+              <a:rPr lang="en-US" sz="1400" dirty="0">
                 <a:solidFill>
                   <a:srgbClr val="00B050"/>
                 </a:solidFill>
@@ -4022,7 +4025,7 @@
               <a:buNone/>
             </a:pPr>
             <a:r>
-              <a:rPr lang="en-US" sz="1200" dirty="0">
+              <a:rPr lang="en-US" sz="1400" dirty="0">
                 <a:cs typeface="Times New Roman" panose="02020603050405020304" pitchFamily="18" charset="0"/>
               </a:rPr>
               <a:t>	&lt;/target&gt;</a:t>
@@ -4036,18 +4039,18 @@
               <a:buNone/>
             </a:pPr>
             <a:r>
-              <a:rPr lang="en-US" sz="1200" dirty="0">
+              <a:rPr lang="en-US" sz="1400" dirty="0">
                 <a:cs typeface="Times New Roman" panose="02020603050405020304" pitchFamily="18" charset="0"/>
               </a:rPr>
               <a:t>&lt;/system</a:t>
             </a:r>
             <a:r>
-              <a:rPr lang="en-US" sz="1200" dirty="0" smtClean="0">
+              <a:rPr lang="en-US" sz="1400" dirty="0" smtClean="0">
                 <a:cs typeface="Times New Roman" panose="02020603050405020304" pitchFamily="18" charset="0"/>
               </a:rPr>
               <a:t>&gt;</a:t>
             </a:r>
-            <a:endParaRPr lang="en-US" sz="1200" dirty="0">
+            <a:endParaRPr lang="en-US" sz="1400" dirty="0">
               <a:cs typeface="Times New Roman" panose="02020603050405020304" pitchFamily="18" charset="0"/>
             </a:endParaRPr>
           </a:p>
@@ -4541,6 +4544,77 @@
           </a:p>
         </p:txBody>
       </p:sp>
+      <p:pic>
+        <p:nvPicPr>
+          <p:cNvPr id="2" name="Picture 1"/>
+          <p:cNvPicPr>
+            <a:picLocks noChangeAspect="1"/>
+          </p:cNvPicPr>
+          <p:nvPr/>
+        </p:nvPicPr>
+        <p:blipFill>
+          <a:blip r:embed="rId3">
+            <a:extLst>
+              <a:ext uri="{28A0092B-C50C-407E-A947-70E740481C1C}">
+                <a14:useLocalDpi xmlns:a14="http://schemas.microsoft.com/office/drawing/2010/main" val="0"/>
+              </a:ext>
+            </a:extLst>
+          </a:blip>
+          <a:stretch>
+            <a:fillRect/>
+          </a:stretch>
+        </p:blipFill>
+        <p:spPr>
+          <a:xfrm>
+            <a:off x="7917396" y="5517599"/>
+            <a:ext cx="3741420" cy="929640"/>
+          </a:xfrm>
+          <a:prstGeom prst="rect">
+            <a:avLst/>
+          </a:prstGeom>
+          <a:ln>
+            <a:solidFill>
+              <a:srgbClr val="FF0000"/>
+            </a:solidFill>
+          </a:ln>
+        </p:spPr>
+      </p:pic>
+      <p:cxnSp>
+        <p:nvCxnSpPr>
+          <p:cNvPr id="15" name="Straight Arrow Connector 14"/>
+          <p:cNvCxnSpPr/>
+          <p:nvPr/>
+        </p:nvCxnSpPr>
+        <p:spPr>
+          <a:xfrm>
+            <a:off x="10567356" y="2930929"/>
+            <a:ext cx="586599" cy="2586670"/>
+          </a:xfrm>
+          <a:prstGeom prst="straightConnector1">
+            <a:avLst/>
+          </a:prstGeom>
+          <a:ln w="38100">
+            <a:solidFill>
+              <a:srgbClr val="FF0000"/>
+            </a:solidFill>
+            <a:tailEnd type="triangle"/>
+          </a:ln>
+        </p:spPr>
+        <p:style>
+          <a:lnRef idx="1">
+            <a:schemeClr val="accent1"/>
+          </a:lnRef>
+          <a:fillRef idx="0">
+            <a:schemeClr val="accent1"/>
+          </a:fillRef>
+          <a:effectRef idx="0">
+            <a:schemeClr val="accent1"/>
+          </a:effectRef>
+          <a:fontRef idx="minor">
+            <a:schemeClr val="tx1"/>
+          </a:fontRef>
+        </p:style>
+      </p:cxnSp>
     </p:spTree>
     <p:extLst>
       <p:ext uri="{BB962C8B-B14F-4D97-AF65-F5344CB8AC3E}">
@@ -4661,7 +4735,7 @@
         </p:blipFill>
         <p:spPr>
           <a:xfrm>
-            <a:off x="1422098" y="1615727"/>
+            <a:off x="507698" y="1615727"/>
             <a:ext cx="9382310" cy="5127542"/>
           </a:xfrm>
           <a:prstGeom prst="rect">
@@ -4677,7 +4751,7 @@
         </p:nvSpPr>
         <p:spPr>
           <a:xfrm>
-            <a:off x="2984740" y="3757023"/>
+            <a:off x="2070340" y="3757023"/>
             <a:ext cx="1882715" cy="338554"/>
           </a:xfrm>
           <a:prstGeom prst="rect">
@@ -4714,7 +4788,7 @@
         </p:nvSpPr>
         <p:spPr>
           <a:xfrm>
-            <a:off x="8295736" y="3150299"/>
+            <a:off x="7381336" y="3150299"/>
             <a:ext cx="1882715" cy="338554"/>
           </a:xfrm>
           <a:prstGeom prst="rect">
@@ -4743,6 +4817,179 @@
           </a:p>
         </p:txBody>
       </p:sp>
+      <p:sp>
+        <p:nvSpPr>
+          <p:cNvPr id="2" name="Rectangle 1"/>
+          <p:cNvSpPr/>
+          <p:nvPr/>
+        </p:nvSpPr>
+        <p:spPr>
+          <a:xfrm>
+            <a:off x="7134044" y="2124684"/>
+            <a:ext cx="2225615" cy="946320"/>
+          </a:xfrm>
+          <a:prstGeom prst="rect">
+            <a:avLst/>
+          </a:prstGeom>
+          <a:noFill/>
+          <a:ln w="38100">
+            <a:solidFill>
+              <a:srgbClr val="FF0000"/>
+            </a:solidFill>
+          </a:ln>
+        </p:spPr>
+        <p:style>
+          <a:lnRef idx="2">
+            <a:schemeClr val="accent1">
+              <a:shade val="50000"/>
+            </a:schemeClr>
+          </a:lnRef>
+          <a:fillRef idx="1">
+            <a:schemeClr val="accent1"/>
+          </a:fillRef>
+          <a:effectRef idx="0">
+            <a:schemeClr val="accent1"/>
+          </a:effectRef>
+          <a:fontRef idx="minor">
+            <a:schemeClr val="lt1"/>
+          </a:fontRef>
+        </p:style>
+        <p:txBody>
+          <a:bodyPr rtlCol="0" anchor="ctr"/>
+          <a:lstStyle/>
+          <a:p>
+            <a:pPr algn="ctr"/>
+            <a:endParaRPr lang="it-IT"/>
+          </a:p>
+        </p:txBody>
+      </p:sp>
+      <p:sp>
+        <p:nvSpPr>
+          <p:cNvPr id="8" name="Rectangle 7"/>
+          <p:cNvSpPr/>
+          <p:nvPr/>
+        </p:nvSpPr>
+        <p:spPr>
+          <a:xfrm>
+            <a:off x="957532" y="2083065"/>
+            <a:ext cx="2363638" cy="156350"/>
+          </a:xfrm>
+          <a:prstGeom prst="rect">
+            <a:avLst/>
+          </a:prstGeom>
+          <a:noFill/>
+          <a:ln w="38100">
+            <a:solidFill>
+              <a:srgbClr val="FF0000"/>
+            </a:solidFill>
+          </a:ln>
+        </p:spPr>
+        <p:style>
+          <a:lnRef idx="2">
+            <a:schemeClr val="accent1">
+              <a:shade val="50000"/>
+            </a:schemeClr>
+          </a:lnRef>
+          <a:fillRef idx="1">
+            <a:schemeClr val="accent1"/>
+          </a:fillRef>
+          <a:effectRef idx="0">
+            <a:schemeClr val="accent1"/>
+          </a:effectRef>
+          <a:fontRef idx="minor">
+            <a:schemeClr val="lt1"/>
+          </a:fontRef>
+        </p:style>
+        <p:txBody>
+          <a:bodyPr rtlCol="0" anchor="ctr"/>
+          <a:lstStyle/>
+          <a:p>
+            <a:pPr algn="ctr"/>
+            <a:endParaRPr lang="it-IT"/>
+          </a:p>
+        </p:txBody>
+      </p:sp>
+      <p:sp>
+        <p:nvSpPr>
+          <p:cNvPr id="11" name="Rectangle 10"/>
+          <p:cNvSpPr/>
+          <p:nvPr/>
+        </p:nvSpPr>
+        <p:spPr>
+          <a:xfrm>
+            <a:off x="3697855" y="2036487"/>
+            <a:ext cx="2392394" cy="473160"/>
+          </a:xfrm>
+          <a:prstGeom prst="rect">
+            <a:avLst/>
+          </a:prstGeom>
+          <a:noFill/>
+          <a:ln w="38100">
+            <a:solidFill>
+              <a:srgbClr val="FF0000"/>
+            </a:solidFill>
+          </a:ln>
+        </p:spPr>
+        <p:style>
+          <a:lnRef idx="2">
+            <a:schemeClr val="accent1">
+              <a:shade val="50000"/>
+            </a:schemeClr>
+          </a:lnRef>
+          <a:fillRef idx="1">
+            <a:schemeClr val="accent1"/>
+          </a:fillRef>
+          <a:effectRef idx="0">
+            <a:schemeClr val="accent1"/>
+          </a:effectRef>
+          <a:fontRef idx="minor">
+            <a:schemeClr val="lt1"/>
+          </a:fontRef>
+        </p:style>
+        <p:txBody>
+          <a:bodyPr rtlCol="0" anchor="ctr"/>
+          <a:lstStyle/>
+          <a:p>
+            <a:pPr algn="ctr"/>
+            <a:endParaRPr lang="it-IT"/>
+          </a:p>
+        </p:txBody>
+      </p:sp>
+      <p:pic>
+        <p:nvPicPr>
+          <p:cNvPr id="3" name="Picture 2"/>
+          <p:cNvPicPr>
+            <a:picLocks noChangeAspect="1"/>
+          </p:cNvPicPr>
+          <p:nvPr/>
+        </p:nvPicPr>
+        <p:blipFill>
+          <a:blip r:embed="rId3">
+            <a:extLst>
+              <a:ext uri="{28A0092B-C50C-407E-A947-70E740481C1C}">
+                <a14:useLocalDpi xmlns:a14="http://schemas.microsoft.com/office/drawing/2010/main" val="0"/>
+              </a:ext>
+            </a:extLst>
+          </a:blip>
+          <a:stretch>
+            <a:fillRect/>
+          </a:stretch>
+        </p:blipFill>
+        <p:spPr>
+          <a:xfrm>
+            <a:off x="9652456" y="1887908"/>
+            <a:ext cx="2321154" cy="703013"/>
+          </a:xfrm>
+          <a:prstGeom prst="rect">
+            <a:avLst/>
+          </a:prstGeom>
+          <a:ln w="38100">
+            <a:solidFill>
+              <a:srgbClr val="FF0000"/>
+            </a:solidFill>
+          </a:ln>
+        </p:spPr>
+      </p:pic>
     </p:spTree>
     <p:extLst>
       <p:ext uri="{BB962C8B-B14F-4D97-AF65-F5344CB8AC3E}">
@@ -5091,111 +5338,9 @@
           <a:chExt cx="0" cy="0"/>
         </a:xfrm>
       </p:grpSpPr>
-      <p:sp>
-        <p:nvSpPr>
-          <p:cNvPr id="2" name="Title 1"/>
-          <p:cNvSpPr>
-            <a:spLocks noGrp="1"/>
-          </p:cNvSpPr>
-          <p:nvPr>
-            <p:ph type="title"/>
-          </p:nvPr>
-        </p:nvSpPr>
-        <p:spPr>
-          <a:xfrm>
-            <a:off x="838200" y="1"/>
-            <a:ext cx="10515600" cy="1035170"/>
-          </a:xfrm>
-        </p:spPr>
-        <p:txBody>
-          <a:bodyPr/>
-          <a:lstStyle/>
-          <a:p>
-            <a:pPr algn="ctr"/>
-            <a:r>
-              <a:rPr lang="en-US" dirty="0" smtClean="0"/>
-              <a:t>Heuristic function</a:t>
-            </a:r>
-            <a:endParaRPr lang="it-IT" dirty="0"/>
-          </a:p>
-        </p:txBody>
-      </p:sp>
-      <p:sp>
-        <p:nvSpPr>
-          <p:cNvPr id="3" name="Content Placeholder 2"/>
-          <p:cNvSpPr>
-            <a:spLocks noGrp="1"/>
-          </p:cNvSpPr>
-          <p:nvPr>
-            <p:ph idx="1"/>
-          </p:nvPr>
-        </p:nvSpPr>
-        <p:spPr>
-          <a:xfrm>
-            <a:off x="6096000" y="1166367"/>
-            <a:ext cx="5952226" cy="4839416"/>
-          </a:xfrm>
-        </p:spPr>
-        <p:txBody>
-          <a:bodyPr>
-            <a:normAutofit lnSpcReduction="10000"/>
-          </a:bodyPr>
-          <a:lstStyle/>
-          <a:p>
-            <a:r>
-              <a:rPr lang="en-US" dirty="0" smtClean="0"/>
-              <a:t>H1: How far ahead of my opponent I am </a:t>
-            </a:r>
-            <a:r>
-              <a:rPr lang="it-IT" dirty="0"/>
-              <a:t>(My Mancala – Opponent’s Mancala) </a:t>
-            </a:r>
-            <a:endParaRPr lang="en-US" dirty="0" smtClean="0"/>
-          </a:p>
-          <a:p>
-            <a:r>
-              <a:rPr lang="en-US" dirty="0" smtClean="0"/>
-              <a:t>H2: How close I am to winning (&gt; half)</a:t>
-            </a:r>
-          </a:p>
-          <a:p>
-            <a:r>
-              <a:rPr lang="en-US" dirty="0" smtClean="0"/>
-              <a:t>M1: How much can I eat (Doubled)</a:t>
-            </a:r>
-          </a:p>
-          <a:p>
-            <a:r>
-              <a:rPr lang="en-US" dirty="0" smtClean="0"/>
-              <a:t>M2: I have an additional turn</a:t>
-            </a:r>
-          </a:p>
-          <a:p>
-            <a:r>
-              <a:rPr lang="en-US" dirty="0" smtClean="0"/>
-              <a:t>H3: How close opponent is to winning (&gt; half) </a:t>
-            </a:r>
-          </a:p>
-          <a:p>
-            <a:r>
-              <a:rPr lang="en-US" dirty="0" smtClean="0"/>
-              <a:t>M3: How much can my opponent eat</a:t>
-            </a:r>
-          </a:p>
-          <a:p>
-            <a:r>
-              <a:rPr lang="en-US" dirty="0" smtClean="0"/>
-              <a:t>M4: My opponent has an additional turn</a:t>
-            </a:r>
-          </a:p>
-          <a:p>
-            <a:endParaRPr lang="it-IT" dirty="0"/>
-          </a:p>
-        </p:txBody>
-      </p:sp>
       <p:pic>
         <p:nvPicPr>
-          <p:cNvPr id="5" name="Picture 4"/>
+          <p:cNvPr id="4" name="Picture 3"/>
           <p:cNvPicPr>
             <a:picLocks noChangeAspect="1"/>
           </p:cNvPicPr>
@@ -5215,14 +5360,116 @@
         </p:blipFill>
         <p:spPr>
           <a:xfrm>
-            <a:off x="225293" y="1035171"/>
-            <a:ext cx="5951220" cy="5067300"/>
+            <a:off x="202865" y="902395"/>
+            <a:ext cx="5425440" cy="5120640"/>
           </a:xfrm>
           <a:prstGeom prst="rect">
             <a:avLst/>
           </a:prstGeom>
         </p:spPr>
       </p:pic>
+      <p:sp>
+        <p:nvSpPr>
+          <p:cNvPr id="2" name="Title 1"/>
+          <p:cNvSpPr>
+            <a:spLocks noGrp="1"/>
+          </p:cNvSpPr>
+          <p:nvPr>
+            <p:ph type="title"/>
+          </p:nvPr>
+        </p:nvSpPr>
+        <p:spPr>
+          <a:xfrm>
+            <a:off x="838200" y="1"/>
+            <a:ext cx="10515600" cy="1035170"/>
+          </a:xfrm>
+        </p:spPr>
+        <p:txBody>
+          <a:bodyPr/>
+          <a:lstStyle/>
+          <a:p>
+            <a:pPr algn="ctr"/>
+            <a:r>
+              <a:rPr lang="en-US" dirty="0" smtClean="0"/>
+              <a:t>Heuristic function</a:t>
+            </a:r>
+            <a:endParaRPr lang="it-IT" dirty="0"/>
+          </a:p>
+        </p:txBody>
+      </p:sp>
+      <p:sp>
+        <p:nvSpPr>
+          <p:cNvPr id="3" name="Content Placeholder 2"/>
+          <p:cNvSpPr>
+            <a:spLocks noGrp="1"/>
+          </p:cNvSpPr>
+          <p:nvPr>
+            <p:ph idx="1"/>
+          </p:nvPr>
+        </p:nvSpPr>
+        <p:spPr>
+          <a:xfrm>
+            <a:off x="6096000" y="1166367"/>
+            <a:ext cx="5952226" cy="4839416"/>
+          </a:xfrm>
+        </p:spPr>
+        <p:txBody>
+          <a:bodyPr>
+            <a:normAutofit lnSpcReduction="10000"/>
+          </a:bodyPr>
+          <a:lstStyle/>
+          <a:p>
+            <a:r>
+              <a:rPr lang="en-US" dirty="0" smtClean="0"/>
+              <a:t>H1: How far ahead of my opponent I am </a:t>
+            </a:r>
+            <a:r>
+              <a:rPr lang="it-IT" dirty="0"/>
+              <a:t>(My Mancala – Opponent’s Mancala) </a:t>
+            </a:r>
+            <a:endParaRPr lang="en-US" dirty="0" smtClean="0"/>
+          </a:p>
+          <a:p>
+            <a:r>
+              <a:rPr lang="en-US" dirty="0" smtClean="0"/>
+              <a:t>H2: How close I am to winning (&gt; half)</a:t>
+            </a:r>
+          </a:p>
+          <a:p>
+            <a:r>
+              <a:rPr lang="en-US" dirty="0" smtClean="0"/>
+              <a:t>M1: How much can I eat (Doubled)</a:t>
+            </a:r>
+          </a:p>
+          <a:p>
+            <a:r>
+              <a:rPr lang="en-US" dirty="0" smtClean="0"/>
+              <a:t>M2: I have an additional turn</a:t>
+            </a:r>
+          </a:p>
+          <a:p>
+            <a:r>
+              <a:rPr lang="en-US" dirty="0" smtClean="0"/>
+              <a:t>H3: How close opponent is to winning (&gt; half) </a:t>
+            </a:r>
+          </a:p>
+          <a:p>
+            <a:r>
+              <a:rPr lang="en-US" dirty="0" smtClean="0"/>
+              <a:t>M3: How much can my opponent eat</a:t>
+            </a:r>
+          </a:p>
+          <a:p>
+            <a:r>
+              <a:rPr lang="en-US" dirty="0" smtClean="0"/>
+              <a:t>M4: My opponent has an additional turn</a:t>
+            </a:r>
+          </a:p>
+          <a:p>
+            <a:endParaRPr lang="it-IT" dirty="0"/>
+          </a:p>
+        </p:txBody>
+      </p:sp>
       <p:cxnSp>
         <p:nvCxnSpPr>
           <p:cNvPr id="11" name="Straight Arrow Connector 10"/>
@@ -5268,7 +5515,7 @@
         <p:spPr>
           <a:xfrm flipH="1">
             <a:off x="4994694" y="2518913"/>
-            <a:ext cx="1181819" cy="258793"/>
+            <a:ext cx="1181820" cy="181155"/>
           </a:xfrm>
           <a:prstGeom prst="straightConnector1">
             <a:avLst/>
@@ -5303,8 +5550,8 @@
         </p:nvCxnSpPr>
         <p:spPr>
           <a:xfrm flipH="1" flipV="1">
-            <a:off x="5706373" y="2958860"/>
-            <a:ext cx="470140" cy="17253"/>
+            <a:off x="5628305" y="2907102"/>
+            <a:ext cx="548208" cy="69012"/>
           </a:xfrm>
           <a:prstGeom prst="straightConnector1">
             <a:avLst/>
@@ -5339,8 +5586,8 @@
         </p:nvCxnSpPr>
         <p:spPr>
           <a:xfrm flipH="1" flipV="1">
-            <a:off x="5495026" y="3234906"/>
-            <a:ext cx="681487" cy="189781"/>
+            <a:off x="5454770" y="3157268"/>
+            <a:ext cx="721744" cy="267420"/>
           </a:xfrm>
           <a:prstGeom prst="straightConnector1">
             <a:avLst/>
@@ -5375,8 +5622,8 @@
         </p:nvCxnSpPr>
         <p:spPr>
           <a:xfrm flipH="1">
-            <a:off x="4994694" y="3930231"/>
-            <a:ext cx="1181819" cy="598637"/>
+            <a:off x="4908430" y="3930231"/>
+            <a:ext cx="1268084" cy="538252"/>
           </a:xfrm>
           <a:prstGeom prst="straightConnector1">
             <a:avLst/>
@@ -5410,9 +5657,9 @@
           <p:nvPr/>
         </p:nvCxnSpPr>
         <p:spPr>
-          <a:xfrm flipH="1">
-            <a:off x="5605732" y="4718649"/>
-            <a:ext cx="570781" cy="35809"/>
+          <a:xfrm flipH="1" flipV="1">
+            <a:off x="5555411" y="4675517"/>
+            <a:ext cx="621103" cy="43132"/>
           </a:xfrm>
           <a:prstGeom prst="straightConnector1">
             <a:avLst/>
@@ -5447,8 +5694,8 @@
         </p:nvCxnSpPr>
         <p:spPr>
           <a:xfrm flipH="1" flipV="1">
-            <a:off x="5454770" y="5066312"/>
-            <a:ext cx="721744" cy="157881"/>
+            <a:off x="5454770" y="4977442"/>
+            <a:ext cx="721744" cy="246752"/>
           </a:xfrm>
           <a:prstGeom prst="straightConnector1">
             <a:avLst/>
@@ -6761,11 +7008,7 @@
             <a:pPr algn="ctr"/>
             <a:r>
               <a:rPr lang="en-US" dirty="0" smtClean="0"/>
-              <a:t>Rejected </a:t>
-            </a:r>
-            <a:r>
-              <a:rPr lang="en-US" dirty="0" smtClean="0"/>
-              <a:t>Bugs</a:t>
+              <a:t>Rejected Bugs</a:t>
             </a:r>
             <a:endParaRPr lang="it-IT" dirty="0"/>
           </a:p>
@@ -7012,6 +7255,411 @@
     <p:extLst>
       <p:ext uri="{BB962C8B-B14F-4D97-AF65-F5344CB8AC3E}">
         <p14:creationId xmlns:p14="http://schemas.microsoft.com/office/powerpoint/2010/main" val="2087552035"/>
+      </p:ext>
+    </p:extLst>
+  </p:cSld>
+  <p:clrMapOvr>
+    <a:masterClrMapping/>
+  </p:clrMapOvr>
+</p:sld>
+</file>
+
+<file path=ppt/slides/slide23.xml><?xml version="1.0" encoding="utf-8"?>
+<p:sld xmlns:a="http://schemas.openxmlformats.org/drawingml/2006/main" xmlns:r="http://schemas.openxmlformats.org/officeDocument/2006/relationships" xmlns:p="http://schemas.openxmlformats.org/presentationml/2006/main">
+  <p:cSld>
+    <p:spTree>
+      <p:nvGrpSpPr>
+        <p:cNvPr id="1" name=""/>
+        <p:cNvGrpSpPr/>
+        <p:nvPr/>
+      </p:nvGrpSpPr>
+      <p:grpSpPr>
+        <a:xfrm>
+          <a:off x="0" y="0"/>
+          <a:ext cx="0" cy="0"/>
+          <a:chOff x="0" y="0"/>
+          <a:chExt cx="0" cy="0"/>
+        </a:xfrm>
+      </p:grpSpPr>
+    </p:spTree>
+    <p:extLst>
+      <p:ext uri="{BB962C8B-B14F-4D97-AF65-F5344CB8AC3E}">
+        <p14:creationId xmlns:p14="http://schemas.microsoft.com/office/powerpoint/2010/main" val="363385040"/>
+      </p:ext>
+    </p:extLst>
+  </p:cSld>
+  <p:clrMapOvr>
+    <a:masterClrMapping/>
+  </p:clrMapOvr>
+</p:sld>
+</file>
+
+<file path=ppt/slides/slide24.xml><?xml version="1.0" encoding="utf-8"?>
+<p:sld xmlns:a="http://schemas.openxmlformats.org/drawingml/2006/main" xmlns:r="http://schemas.openxmlformats.org/officeDocument/2006/relationships" xmlns:p="http://schemas.openxmlformats.org/presentationml/2006/main">
+  <p:cSld>
+    <p:spTree>
+      <p:nvGrpSpPr>
+        <p:cNvPr id="1" name=""/>
+        <p:cNvGrpSpPr/>
+        <p:nvPr/>
+      </p:nvGrpSpPr>
+      <p:grpSpPr>
+        <a:xfrm>
+          <a:off x="0" y="0"/>
+          <a:ext cx="0" cy="0"/>
+          <a:chOff x="0" y="0"/>
+          <a:chExt cx="0" cy="0"/>
+        </a:xfrm>
+      </p:grpSpPr>
+      <p:sp>
+        <p:nvSpPr>
+          <p:cNvPr id="2" name="Title 1"/>
+          <p:cNvSpPr>
+            <a:spLocks noGrp="1"/>
+          </p:cNvSpPr>
+          <p:nvPr>
+            <p:ph type="title"/>
+          </p:nvPr>
+        </p:nvSpPr>
+        <p:spPr>
+          <a:xfrm>
+            <a:off x="838200" y="149464"/>
+            <a:ext cx="10515600" cy="1325563"/>
+          </a:xfrm>
+        </p:spPr>
+        <p:txBody>
+          <a:bodyPr/>
+          <a:lstStyle/>
+          <a:p>
+            <a:pPr algn="ctr"/>
+            <a:r>
+              <a:rPr lang="en-US" dirty="0" smtClean="0"/>
+              <a:t>Foreign mates: Recap</a:t>
+            </a:r>
+            <a:endParaRPr lang="it-IT" dirty="0"/>
+          </a:p>
+        </p:txBody>
+      </p:sp>
+      <p:graphicFrame>
+        <p:nvGraphicFramePr>
+          <p:cNvPr id="4" name="Content Placeholder 3"/>
+          <p:cNvGraphicFramePr>
+            <a:graphicFrameLocks noGrp="1"/>
+          </p:cNvGraphicFramePr>
+          <p:nvPr>
+            <p:ph idx="1"/>
+            <p:extLst>
+              <p:ext uri="{D42A27DB-BD31-4B8C-83A1-F6EECF244321}">
+                <p14:modId xmlns:p14="http://schemas.microsoft.com/office/powerpoint/2010/main" val="1712801412"/>
+              </p:ext>
+            </p:extLst>
+          </p:nvPr>
+        </p:nvGraphicFramePr>
+        <p:xfrm>
+          <a:off x="838200" y="2294626"/>
+          <a:ext cx="10515600" cy="4135320"/>
+        </p:xfrm>
+        <a:graphic>
+          <a:graphicData uri="http://schemas.openxmlformats.org/drawingml/2006/table">
+            <a:tbl>
+              <a:tblPr firstRow="1" bandRow="1">
+                <a:tableStyleId>{2D5ABB26-0587-4C30-8999-92F81FD0307C}</a:tableStyleId>
+              </a:tblPr>
+              <a:tblGrid>
+                <a:gridCol w="2310442"/>
+                <a:gridCol w="8205158"/>
+              </a:tblGrid>
+              <a:tr h="948905">
+                <a:tc>
+                  <a:txBody>
+                    <a:bodyPr/>
+                    <a:lstStyle/>
+                    <a:p>
+                      <a:r>
+                        <a:rPr lang="en-US" b="1" dirty="0" smtClean="0"/>
+                        <a:t>Communication</a:t>
+                      </a:r>
+                      <a:endParaRPr lang="it-IT" b="1" dirty="0"/>
+                    </a:p>
+                  </a:txBody>
+                  <a:tcPr>
+                    <a:lnL>
+                      <a:noFill/>
+                    </a:lnL>
+                    <a:lnR>
+                      <a:noFill/>
+                    </a:lnR>
+                    <a:lnT>
+                      <a:noFill/>
+                    </a:lnT>
+                    <a:lnB w="12700" cap="flat" cmpd="sng" algn="ctr">
+                      <a:solidFill>
+                        <a:schemeClr val="tx1"/>
+                      </a:solidFill>
+                      <a:prstDash val="solid"/>
+                      <a:round/>
+                      <a:headEnd type="none" w="med" len="med"/>
+                      <a:tailEnd type="none" w="med" len="med"/>
+                    </a:lnB>
+                    <a:lnTlToBr w="12700" cmpd="sng">
+                      <a:noFill/>
+                      <a:prstDash val="solid"/>
+                    </a:lnTlToBr>
+                    <a:lnBlToTr w="12700" cmpd="sng">
+                      <a:noFill/>
+                      <a:prstDash val="solid"/>
+                    </a:lnBlToTr>
+                  </a:tcPr>
+                </a:tc>
+                <a:tc>
+                  <a:txBody>
+                    <a:bodyPr/>
+                    <a:lstStyle/>
+                    <a:p>
+                      <a:r>
+                        <a:rPr lang="en-US" dirty="0" smtClean="0"/>
+                        <a:t>No problem at all. They</a:t>
+                      </a:r>
+                      <a:r>
+                        <a:rPr lang="en-US" baseline="0" dirty="0" smtClean="0"/>
+                        <a:t> answered always in little time (considering the time zone) and participated to conversations on Skype and Telegram.</a:t>
+                      </a:r>
+                      <a:br>
+                        <a:rPr lang="en-US" baseline="0" dirty="0" smtClean="0"/>
+                      </a:br>
+                      <a:r>
+                        <a:rPr lang="en-US" baseline="0" dirty="0" smtClean="0"/>
+                        <a:t>At the end they asked for our pictures and congratulated for our nice work and leadership.</a:t>
+                      </a:r>
+                    </a:p>
+                  </a:txBody>
+                  <a:tcPr>
+                    <a:lnL>
+                      <a:noFill/>
+                    </a:lnL>
+                    <a:lnR>
+                      <a:noFill/>
+                    </a:lnR>
+                    <a:lnT>
+                      <a:noFill/>
+                    </a:lnT>
+                    <a:lnB w="12700" cap="flat" cmpd="sng" algn="ctr">
+                      <a:solidFill>
+                        <a:schemeClr val="tx1"/>
+                      </a:solidFill>
+                      <a:prstDash val="solid"/>
+                      <a:round/>
+                      <a:headEnd type="none" w="med" len="med"/>
+                      <a:tailEnd type="none" w="med" len="med"/>
+                    </a:lnB>
+                    <a:lnTlToBr w="12700" cmpd="sng">
+                      <a:noFill/>
+                      <a:prstDash val="solid"/>
+                    </a:lnTlToBr>
+                    <a:lnBlToTr w="12700" cmpd="sng">
+                      <a:noFill/>
+                      <a:prstDash val="solid"/>
+                    </a:lnBlToTr>
+                  </a:tcPr>
+                </a:tc>
+              </a:tr>
+              <a:tr h="1473300">
+                <a:tc>
+                  <a:txBody>
+                    <a:bodyPr/>
+                    <a:lstStyle/>
+                    <a:p>
+                      <a:r>
+                        <a:rPr lang="en-US" b="1" dirty="0" smtClean="0"/>
+                        <a:t>Library</a:t>
+                      </a:r>
+                      <a:endParaRPr lang="it-IT" b="1" dirty="0"/>
+                    </a:p>
+                  </a:txBody>
+                  <a:tcPr>
+                    <a:lnL>
+                      <a:noFill/>
+                    </a:lnL>
+                    <a:lnR>
+                      <a:noFill/>
+                    </a:lnR>
+                    <a:lnT w="12700" cap="flat" cmpd="sng" algn="ctr">
+                      <a:solidFill>
+                        <a:schemeClr val="tx1"/>
+                      </a:solidFill>
+                      <a:prstDash val="solid"/>
+                      <a:round/>
+                      <a:headEnd type="none" w="med" len="med"/>
+                      <a:tailEnd type="none" w="med" len="med"/>
+                    </a:lnT>
+                    <a:lnB w="12700" cap="flat" cmpd="sng" algn="ctr">
+                      <a:solidFill>
+                        <a:schemeClr val="tx1"/>
+                      </a:solidFill>
+                      <a:prstDash val="solid"/>
+                      <a:round/>
+                      <a:headEnd type="none" w="med" len="med"/>
+                      <a:tailEnd type="none" w="med" len="med"/>
+                    </a:lnB>
+                    <a:lnTlToBr w="12700" cmpd="sng">
+                      <a:noFill/>
+                      <a:prstDash val="solid"/>
+                    </a:lnTlToBr>
+                    <a:lnBlToTr w="12700" cmpd="sng">
+                      <a:noFill/>
+                      <a:prstDash val="solid"/>
+                    </a:lnBlToTr>
+                  </a:tcPr>
+                </a:tc>
+                <a:tc>
+                  <a:txBody>
+                    <a:bodyPr/>
+                    <a:lstStyle/>
+                    <a:p>
+                      <a:r>
+                        <a:rPr lang="en-US" dirty="0" smtClean="0"/>
+                        <a:t>Their</a:t>
+                      </a:r>
+                      <a:r>
+                        <a:rPr lang="en-US" baseline="0" dirty="0" smtClean="0"/>
+                        <a:t> code seemed well written but it didn’t even compile, lucky were just little errors (not creating an object, not resetting a variable). We spent a lot of time during the testing phase because they did not understand well how to set up test and still often their code did not compile, like they did not even try to execute it before pushing. We ended up correcting some part ourselves.</a:t>
+                      </a:r>
+                      <a:endParaRPr lang="it-IT" dirty="0"/>
+                    </a:p>
+                  </a:txBody>
+                  <a:tcPr>
+                    <a:lnL>
+                      <a:noFill/>
+                    </a:lnL>
+                    <a:lnR>
+                      <a:noFill/>
+                    </a:lnR>
+                    <a:lnT w="12700" cap="flat" cmpd="sng" algn="ctr">
+                      <a:solidFill>
+                        <a:schemeClr val="tx1"/>
+                      </a:solidFill>
+                      <a:prstDash val="solid"/>
+                      <a:round/>
+                      <a:headEnd type="none" w="med" len="med"/>
+                      <a:tailEnd type="none" w="med" len="med"/>
+                    </a:lnT>
+                    <a:lnB w="12700" cap="flat" cmpd="sng" algn="ctr">
+                      <a:solidFill>
+                        <a:schemeClr val="tx1"/>
+                      </a:solidFill>
+                      <a:prstDash val="solid"/>
+                      <a:round/>
+                      <a:headEnd type="none" w="med" len="med"/>
+                      <a:tailEnd type="none" w="med" len="med"/>
+                    </a:lnB>
+                    <a:lnTlToBr w="12700" cmpd="sng">
+                      <a:noFill/>
+                      <a:prstDash val="solid"/>
+                    </a:lnTlToBr>
+                    <a:lnBlToTr w="12700" cmpd="sng">
+                      <a:noFill/>
+                      <a:prstDash val="solid"/>
+                    </a:lnBlToTr>
+                  </a:tcPr>
+                </a:tc>
+              </a:tr>
+              <a:tr h="1473300">
+                <a:tc>
+                  <a:txBody>
+                    <a:bodyPr/>
+                    <a:lstStyle/>
+                    <a:p>
+                      <a:r>
+                        <a:rPr lang="en-US" b="1" dirty="0" smtClean="0"/>
+                        <a:t>App</a:t>
+                      </a:r>
+                      <a:endParaRPr lang="it-IT" b="1" dirty="0"/>
+                    </a:p>
+                  </a:txBody>
+                  <a:tcPr>
+                    <a:lnT w="12700" cap="flat" cmpd="sng" algn="ctr">
+                      <a:solidFill>
+                        <a:schemeClr val="tx1"/>
+                      </a:solidFill>
+                      <a:prstDash val="solid"/>
+                      <a:round/>
+                      <a:headEnd type="none" w="med" len="med"/>
+                      <a:tailEnd type="none" w="med" len="med"/>
+                    </a:lnT>
+                  </a:tcPr>
+                </a:tc>
+                <a:tc>
+                  <a:txBody>
+                    <a:bodyPr/>
+                    <a:lstStyle/>
+                    <a:p>
+                      <a:r>
+                        <a:rPr lang="en-US" dirty="0" smtClean="0"/>
+                        <a:t>They were not so happy</a:t>
+                      </a:r>
+                      <a:r>
+                        <a:rPr lang="en-US" baseline="0" dirty="0" smtClean="0"/>
+                        <a:t> to work on the GUI but accepted and made a very nice Interface. They collaborate a lot with us during the final phase, the last day they woke up very early to stay with us all time till the deadline.</a:t>
+                      </a:r>
+                      <a:endParaRPr lang="it-IT" dirty="0"/>
+                    </a:p>
+                  </a:txBody>
+                  <a:tcPr>
+                    <a:lnT w="12700" cap="flat" cmpd="sng" algn="ctr">
+                      <a:solidFill>
+                        <a:schemeClr val="tx1"/>
+                      </a:solidFill>
+                      <a:prstDash val="solid"/>
+                      <a:round/>
+                      <a:headEnd type="none" w="med" len="med"/>
+                      <a:tailEnd type="none" w="med" len="med"/>
+                    </a:lnT>
+                  </a:tcPr>
+                </a:tc>
+              </a:tr>
+            </a:tbl>
+          </a:graphicData>
+        </a:graphic>
+      </p:graphicFrame>
+      <p:pic>
+        <p:nvPicPr>
+          <p:cNvPr id="5" name="Picture 4"/>
+          <p:cNvPicPr>
+            <a:picLocks noChangeAspect="1"/>
+          </p:cNvPicPr>
+          <p:nvPr/>
+        </p:nvPicPr>
+        <p:blipFill>
+          <a:blip r:embed="rId2" cstate="print">
+            <a:extLst>
+              <a:ext uri="{28A0092B-C50C-407E-A947-70E740481C1C}">
+                <a14:useLocalDpi xmlns:a14="http://schemas.microsoft.com/office/drawing/2010/main" val="0"/>
+              </a:ext>
+            </a:extLst>
+          </a:blip>
+          <a:stretch>
+            <a:fillRect/>
+          </a:stretch>
+        </p:blipFill>
+        <p:spPr>
+          <a:xfrm>
+            <a:off x="1210573" y="328431"/>
+            <a:ext cx="1834552" cy="1146596"/>
+          </a:xfrm>
+          <a:prstGeom prst="rect">
+            <a:avLst/>
+          </a:prstGeom>
+          <a:ln w="3175">
+            <a:solidFill>
+              <a:schemeClr val="tx1"/>
+            </a:solidFill>
+          </a:ln>
+        </p:spPr>
+      </p:pic>
+    </p:spTree>
+    <p:extLst>
+      <p:ext uri="{BB962C8B-B14F-4D97-AF65-F5344CB8AC3E}">
+        <p14:creationId xmlns:p14="http://schemas.microsoft.com/office/powerpoint/2010/main" val="907380183"/>
       </p:ext>
     </p:extLst>
   </p:cSld>
@@ -7875,8 +8523,9 @@
             </a:pPr>
             <a:r>
               <a:rPr lang="en-US" dirty="0" smtClean="0"/>
-              <a:t>Lessons</a:t>
-            </a:r>
+              <a:t>Lessons Schedule</a:t>
+            </a:r>
+            <a:endParaRPr lang="en-US" dirty="0" smtClean="0"/>
           </a:p>
           <a:p>
             <a:pPr>

</xml_diff>